<commit_message>
uploading compressed version of report
</commit_message>
<xml_diff>
--- a/data_structure/charts.pptx
+++ b/data_structure/charts.pptx
@@ -5,7 +5,7 @@
     <p:sldMasterId id="2147483672" r:id="rId1"/>
   </p:sldMasterIdLst>
   <p:notesMasterIdLst>
-    <p:notesMasterId r:id="rId26"/>
+    <p:notesMasterId r:id="rId27"/>
   </p:notesMasterIdLst>
   <p:sldIdLst>
     <p:sldId id="256" r:id="rId2"/>
@@ -32,6 +32,7 @@
     <p:sldId id="281" r:id="rId23"/>
     <p:sldId id="282" r:id="rId24"/>
     <p:sldId id="283" r:id="rId25"/>
+    <p:sldId id="284" r:id="rId26"/>
   </p:sldIdLst>
   <p:sldSz cx="21674138" cy="12192000"/>
   <p:notesSz cx="6858000" cy="9144000"/>
@@ -220,7 +221,7 @@
           <a:p>
             <a:fld id="{061D1934-5DF5-C54F-B23E-73DBB33C8C5F}" type="datetimeFigureOut">
               <a:rPr lang="en-US" smtClean="0"/>
-              <a:t>1/1/18</a:t>
+              <a:t>1/2/18</a:t>
             </a:fld>
             <a:endParaRPr lang="en-US"/>
           </a:p>
@@ -577,6 +578,90 @@
 </p:notes>
 </file>
 
+<file path=ppt/notesSlides/notesSlide10.xml><?xml version="1.0" encoding="utf-8"?>
+<p:notes xmlns:a="http://schemas.openxmlformats.org/drawingml/2006/main" xmlns:r="http://schemas.openxmlformats.org/officeDocument/2006/relationships" xmlns:p="http://schemas.openxmlformats.org/presentationml/2006/main">
+  <p:cSld>
+    <p:spTree>
+      <p:nvGrpSpPr>
+        <p:cNvPr id="1" name=""/>
+        <p:cNvGrpSpPr/>
+        <p:nvPr/>
+      </p:nvGrpSpPr>
+      <p:grpSpPr>
+        <a:xfrm>
+          <a:off x="0" y="0"/>
+          <a:ext cx="0" cy="0"/>
+          <a:chOff x="0" y="0"/>
+          <a:chExt cx="0" cy="0"/>
+        </a:xfrm>
+      </p:grpSpPr>
+      <p:sp>
+        <p:nvSpPr>
+          <p:cNvPr id="2" name="Slide Image Placeholder 1"/>
+          <p:cNvSpPr>
+            <a:spLocks noGrp="1" noRot="1" noChangeAspect="1"/>
+          </p:cNvSpPr>
+          <p:nvPr>
+            <p:ph type="sldImg"/>
+          </p:nvPr>
+        </p:nvSpPr>
+        <p:spPr/>
+      </p:sp>
+      <p:sp>
+        <p:nvSpPr>
+          <p:cNvPr id="3" name="Notes Placeholder 2"/>
+          <p:cNvSpPr>
+            <a:spLocks noGrp="1"/>
+          </p:cNvSpPr>
+          <p:nvPr>
+            <p:ph type="body" idx="1"/>
+          </p:nvPr>
+        </p:nvSpPr>
+        <p:spPr/>
+        <p:txBody>
+          <a:bodyPr/>
+          <a:lstStyle/>
+          <a:p>
+            <a:endParaRPr lang="en-US" dirty="0"/>
+          </a:p>
+        </p:txBody>
+      </p:sp>
+      <p:sp>
+        <p:nvSpPr>
+          <p:cNvPr id="4" name="Slide Number Placeholder 3"/>
+          <p:cNvSpPr>
+            <a:spLocks noGrp="1"/>
+          </p:cNvSpPr>
+          <p:nvPr>
+            <p:ph type="sldNum" sz="quarter" idx="10"/>
+          </p:nvPr>
+        </p:nvSpPr>
+        <p:spPr/>
+        <p:txBody>
+          <a:bodyPr/>
+          <a:lstStyle/>
+          <a:p>
+            <a:fld id="{16A60896-5EA2-E84A-8303-B8EF42F20825}" type="slidenum">
+              <a:rPr lang="en-US" smtClean="0"/>
+              <a:t>25</a:t>
+            </a:fld>
+            <a:endParaRPr lang="en-US"/>
+          </a:p>
+        </p:txBody>
+      </p:sp>
+    </p:spTree>
+    <p:extLst>
+      <p:ext uri="{BB962C8B-B14F-4D97-AF65-F5344CB8AC3E}">
+        <p14:creationId xmlns:p14="http://schemas.microsoft.com/office/powerpoint/2010/main" val="1005814078"/>
+      </p:ext>
+    </p:extLst>
+  </p:cSld>
+  <p:clrMapOvr>
+    <a:masterClrMapping/>
+  </p:clrMapOvr>
+</p:notes>
+</file>
+
 <file path=ppt/notesSlides/notesSlide2.xml><?xml version="1.0" encoding="utf-8"?>
 <p:notes xmlns:a="http://schemas.openxmlformats.org/drawingml/2006/main" xmlns:r="http://schemas.openxmlformats.org/officeDocument/2006/relationships" xmlns:p="http://schemas.openxmlformats.org/presentationml/2006/main">
   <p:cSld>
@@ -1390,7 +1475,7 @@
           <a:p>
             <a:fld id="{C54E8006-D355-7B42-8642-83EF30980978}" type="datetimeFigureOut">
               <a:rPr lang="en-US" smtClean="0"/>
-              <a:t>1/1/18</a:t>
+              <a:t>1/2/18</a:t>
             </a:fld>
             <a:endParaRPr lang="en-US"/>
           </a:p>
@@ -1560,7 +1645,7 @@
           <a:p>
             <a:fld id="{C54E8006-D355-7B42-8642-83EF30980978}" type="datetimeFigureOut">
               <a:rPr lang="en-US" smtClean="0"/>
-              <a:t>1/1/18</a:t>
+              <a:t>1/2/18</a:t>
             </a:fld>
             <a:endParaRPr lang="en-US"/>
           </a:p>
@@ -1740,7 +1825,7 @@
           <a:p>
             <a:fld id="{C54E8006-D355-7B42-8642-83EF30980978}" type="datetimeFigureOut">
               <a:rPr lang="en-US" smtClean="0"/>
-              <a:t>1/1/18</a:t>
+              <a:t>1/2/18</a:t>
             </a:fld>
             <a:endParaRPr lang="en-US"/>
           </a:p>
@@ -1910,7 +1995,7 @@
           <a:p>
             <a:fld id="{C54E8006-D355-7B42-8642-83EF30980978}" type="datetimeFigureOut">
               <a:rPr lang="en-US" smtClean="0"/>
-              <a:t>1/1/18</a:t>
+              <a:t>1/2/18</a:t>
             </a:fld>
             <a:endParaRPr lang="en-US"/>
           </a:p>
@@ -2156,7 +2241,7 @@
           <a:p>
             <a:fld id="{C54E8006-D355-7B42-8642-83EF30980978}" type="datetimeFigureOut">
               <a:rPr lang="en-US" smtClean="0"/>
-              <a:t>1/1/18</a:t>
+              <a:t>1/2/18</a:t>
             </a:fld>
             <a:endParaRPr lang="en-US"/>
           </a:p>
@@ -2388,7 +2473,7 @@
           <a:p>
             <a:fld id="{C54E8006-D355-7B42-8642-83EF30980978}" type="datetimeFigureOut">
               <a:rPr lang="en-US" smtClean="0"/>
-              <a:t>1/1/18</a:t>
+              <a:t>1/2/18</a:t>
             </a:fld>
             <a:endParaRPr lang="en-US"/>
           </a:p>
@@ -2755,7 +2840,7 @@
           <a:p>
             <a:fld id="{C54E8006-D355-7B42-8642-83EF30980978}" type="datetimeFigureOut">
               <a:rPr lang="en-US" smtClean="0"/>
-              <a:t>1/1/18</a:t>
+              <a:t>1/2/18</a:t>
             </a:fld>
             <a:endParaRPr lang="en-US"/>
           </a:p>
@@ -2873,7 +2958,7 @@
           <a:p>
             <a:fld id="{C54E8006-D355-7B42-8642-83EF30980978}" type="datetimeFigureOut">
               <a:rPr lang="en-US" smtClean="0"/>
-              <a:t>1/1/18</a:t>
+              <a:t>1/2/18</a:t>
             </a:fld>
             <a:endParaRPr lang="en-US"/>
           </a:p>
@@ -2968,7 +3053,7 @@
           <a:p>
             <a:fld id="{C54E8006-D355-7B42-8642-83EF30980978}" type="datetimeFigureOut">
               <a:rPr lang="en-US" smtClean="0"/>
-              <a:t>1/1/18</a:t>
+              <a:t>1/2/18</a:t>
             </a:fld>
             <a:endParaRPr lang="en-US"/>
           </a:p>
@@ -3245,7 +3330,7 @@
           <a:p>
             <a:fld id="{C54E8006-D355-7B42-8642-83EF30980978}" type="datetimeFigureOut">
               <a:rPr lang="en-US" smtClean="0"/>
-              <a:t>1/1/18</a:t>
+              <a:t>1/2/18</a:t>
             </a:fld>
             <a:endParaRPr lang="en-US"/>
           </a:p>
@@ -3502,7 +3587,7 @@
           <a:p>
             <a:fld id="{C54E8006-D355-7B42-8642-83EF30980978}" type="datetimeFigureOut">
               <a:rPr lang="en-US" smtClean="0"/>
-              <a:t>1/1/18</a:t>
+              <a:t>1/2/18</a:t>
             </a:fld>
             <a:endParaRPr lang="en-US"/>
           </a:p>
@@ -3715,7 +3800,7 @@
           <a:p>
             <a:fld id="{C54E8006-D355-7B42-8642-83EF30980978}" type="datetimeFigureOut">
               <a:rPr lang="en-US" smtClean="0"/>
-              <a:t>1/1/18</a:t>
+              <a:t>1/2/18</a:t>
             </a:fld>
             <a:endParaRPr lang="en-US"/>
           </a:p>
@@ -32269,11 +32354,7 @@
             <a:pPr algn="ctr"/>
             <a:r>
               <a:rPr lang="zh-CN" altLang="en-US" sz="1801" dirty="0" smtClean="0"/>
-              <a:t>顶点数量已经达到最大</a:t>
-            </a:r>
-            <a:r>
-              <a:rPr lang="zh-CN" altLang="en-US" sz="1801" dirty="0" smtClean="0"/>
-              <a:t>，即</a:t>
+              <a:t>顶点数量已经达到最大，即</a:t>
             </a:r>
             <a:endParaRPr lang="en-US" altLang="zh-CN" sz="1801" dirty="0" smtClean="0"/>
           </a:p>
@@ -32367,11 +32448,7 @@
             <a:pPr algn="ctr"/>
             <a:r>
               <a:rPr lang="zh-CN" altLang="en-US" sz="1801" dirty="0" smtClean="0"/>
-              <a:t>图中还没有顶点</a:t>
-            </a:r>
-            <a:r>
-              <a:rPr lang="zh-CN" altLang="en-US" sz="1801" dirty="0" smtClean="0"/>
-              <a:t>，即</a:t>
+              <a:t>图中还没有顶点，即</a:t>
             </a:r>
             <a:endParaRPr lang="en-US" altLang="zh-CN" sz="1801" dirty="0" smtClean="0"/>
           </a:p>
@@ -35204,15 +35281,7 @@
             <a:pPr algn="ctr"/>
             <a:r>
               <a:rPr lang="zh-CN" altLang="en-US" sz="1801" dirty="0" smtClean="0"/>
-              <a:t>令原第</a:t>
-            </a:r>
-            <a:r>
-              <a:rPr lang="zh-CN" altLang="en-US" sz="1801" dirty="0" smtClean="0"/>
-              <a:t>一</a:t>
-            </a:r>
-            <a:r>
-              <a:rPr lang="zh-CN" altLang="en-US" sz="1801" dirty="0" smtClean="0"/>
-              <a:t>个元素指向的下一个地址为第一个元素的地址</a:t>
+              <a:t>令原第一个元素指向的下一个地址为第一个元素的地址</a:t>
             </a:r>
             <a:endParaRPr lang="en-US" sz="1801" dirty="0"/>
           </a:p>
@@ -35641,70 +35710,6 @@
               <a:t>Y</a:t>
             </a:r>
             <a:endParaRPr lang="en-US" smtClean="0"/>
-          </a:p>
-        </p:txBody>
-      </p:sp>
-      <p:sp>
-        <p:nvSpPr>
-          <p:cNvPr id="229" name="TextBox 228"/>
-          <p:cNvSpPr txBox="1"/>
-          <p:nvPr/>
-        </p:nvSpPr>
-        <p:spPr>
-          <a:xfrm>
-            <a:off x="2698422" y="7334607"/>
-            <a:ext cx="300082" cy="369332"/>
-          </a:xfrm>
-          <a:prstGeom prst="rect">
-            <a:avLst/>
-          </a:prstGeom>
-          <a:noFill/>
-        </p:spPr>
-        <p:txBody>
-          <a:bodyPr wrap="none" rtlCol="0">
-            <a:spAutoFit/>
-          </a:bodyPr>
-          <a:lstStyle/>
-          <a:p>
-            <a:r>
-              <a:rPr lang="en-US" dirty="0" smtClean="0"/>
-              <a:t>*</a:t>
-            </a:r>
-            <a:endParaRPr lang="en-US" dirty="0"/>
-          </a:p>
-        </p:txBody>
-      </p:sp>
-      <p:sp>
-        <p:nvSpPr>
-          <p:cNvPr id="230" name="TextBox 229"/>
-          <p:cNvSpPr txBox="1"/>
-          <p:nvPr/>
-        </p:nvSpPr>
-        <p:spPr>
-          <a:xfrm>
-            <a:off x="831076" y="11554995"/>
-            <a:ext cx="6585457" cy="369332"/>
-          </a:xfrm>
-          <a:prstGeom prst="rect">
-            <a:avLst/>
-          </a:prstGeom>
-          <a:noFill/>
-        </p:spPr>
-        <p:txBody>
-          <a:bodyPr wrap="none" rtlCol="0">
-            <a:spAutoFit/>
-          </a:bodyPr>
-          <a:lstStyle/>
-          <a:p>
-            <a:r>
-              <a:rPr lang="en-US" dirty="0" smtClean="0"/>
-              <a:t>* </a:t>
-            </a:r>
-            <a:r>
-              <a:rPr lang="zh-CN" altLang="en-US" dirty="0" smtClean="0"/>
-              <a:t>由于只涉及简单图，循环条件最多成立一次，该循环可以舍去</a:t>
-            </a:r>
-            <a:endParaRPr lang="en-US" dirty="0"/>
           </a:p>
         </p:txBody>
       </p:sp>
@@ -42122,6 +42127,2885 @@
 </p:sld>
 </file>
 
+<file path=ppt/slides/slide25.xml><?xml version="1.0" encoding="utf-8"?>
+<p:sld xmlns:a="http://schemas.openxmlformats.org/drawingml/2006/main" xmlns:r="http://schemas.openxmlformats.org/officeDocument/2006/relationships" xmlns:p="http://schemas.openxmlformats.org/presentationml/2006/main">
+  <p:cSld>
+    <p:spTree>
+      <p:nvGrpSpPr>
+        <p:cNvPr id="1" name=""/>
+        <p:cNvGrpSpPr/>
+        <p:nvPr/>
+      </p:nvGrpSpPr>
+      <p:grpSpPr>
+        <a:xfrm>
+          <a:off x="0" y="0"/>
+          <a:ext cx="0" cy="0"/>
+          <a:chOff x="0" y="0"/>
+          <a:chExt cx="0" cy="0"/>
+        </a:xfrm>
+      </p:grpSpPr>
+      <p:sp>
+        <p:nvSpPr>
+          <p:cNvPr id="4" name="Oval 3"/>
+          <p:cNvSpPr/>
+          <p:nvPr/>
+        </p:nvSpPr>
+        <p:spPr>
+          <a:xfrm>
+            <a:off x="2111828" y="1293584"/>
+            <a:ext cx="317500" cy="317500"/>
+          </a:xfrm>
+          <a:prstGeom prst="ellipse">
+            <a:avLst/>
+          </a:prstGeom>
+        </p:spPr>
+        <p:style>
+          <a:lnRef idx="2">
+            <a:schemeClr val="dk1"/>
+          </a:lnRef>
+          <a:fillRef idx="1">
+            <a:schemeClr val="lt1"/>
+          </a:fillRef>
+          <a:effectRef idx="0">
+            <a:schemeClr val="dk1"/>
+          </a:effectRef>
+          <a:fontRef idx="minor">
+            <a:schemeClr val="dk1"/>
+          </a:fontRef>
+        </p:style>
+        <p:txBody>
+          <a:bodyPr rtlCol="0" anchor="ctr"/>
+          <a:lstStyle/>
+          <a:p>
+            <a:pPr algn="ctr"/>
+            <a:r>
+              <a:rPr lang="en-US" sz="1801" dirty="0">
+                <a:solidFill>
+                  <a:schemeClr val="dk1"/>
+                </a:solidFill>
+              </a:rPr>
+              <a:t>1</a:t>
+            </a:r>
+          </a:p>
+        </p:txBody>
+      </p:sp>
+      <p:sp>
+        <p:nvSpPr>
+          <p:cNvPr id="5" name="Oval 4"/>
+          <p:cNvSpPr/>
+          <p:nvPr/>
+        </p:nvSpPr>
+        <p:spPr>
+          <a:xfrm>
+            <a:off x="1631042" y="1778905"/>
+            <a:ext cx="317500" cy="317500"/>
+          </a:xfrm>
+          <a:prstGeom prst="ellipse">
+            <a:avLst/>
+          </a:prstGeom>
+        </p:spPr>
+        <p:style>
+          <a:lnRef idx="2">
+            <a:schemeClr val="dk1"/>
+          </a:lnRef>
+          <a:fillRef idx="1">
+            <a:schemeClr val="lt1"/>
+          </a:fillRef>
+          <a:effectRef idx="0">
+            <a:schemeClr val="dk1"/>
+          </a:effectRef>
+          <a:fontRef idx="minor">
+            <a:schemeClr val="dk1"/>
+          </a:fontRef>
+        </p:style>
+        <p:txBody>
+          <a:bodyPr rtlCol="0" anchor="ctr"/>
+          <a:lstStyle/>
+          <a:p>
+            <a:pPr algn="ctr"/>
+            <a:r>
+              <a:rPr lang="en-US" sz="1801" dirty="0" smtClean="0"/>
+              <a:t>2</a:t>
+            </a:r>
+            <a:endParaRPr lang="en-US" sz="1801" dirty="0">
+              <a:solidFill>
+                <a:schemeClr val="dk1"/>
+              </a:solidFill>
+            </a:endParaRPr>
+          </a:p>
+        </p:txBody>
+      </p:sp>
+      <p:sp>
+        <p:nvSpPr>
+          <p:cNvPr id="7" name="Oval 6"/>
+          <p:cNvSpPr/>
+          <p:nvPr/>
+        </p:nvSpPr>
+        <p:spPr>
+          <a:xfrm>
+            <a:off x="2079170" y="2229754"/>
+            <a:ext cx="317500" cy="317500"/>
+          </a:xfrm>
+          <a:prstGeom prst="ellipse">
+            <a:avLst/>
+          </a:prstGeom>
+        </p:spPr>
+        <p:style>
+          <a:lnRef idx="2">
+            <a:schemeClr val="dk1"/>
+          </a:lnRef>
+          <a:fillRef idx="1">
+            <a:schemeClr val="lt1"/>
+          </a:fillRef>
+          <a:effectRef idx="0">
+            <a:schemeClr val="dk1"/>
+          </a:effectRef>
+          <a:fontRef idx="minor">
+            <a:schemeClr val="dk1"/>
+          </a:fontRef>
+        </p:style>
+        <p:txBody>
+          <a:bodyPr rtlCol="0" anchor="ctr"/>
+          <a:lstStyle/>
+          <a:p>
+            <a:pPr algn="ctr"/>
+            <a:r>
+              <a:rPr lang="en-US" sz="1801"/>
+              <a:t>4</a:t>
+            </a:r>
+            <a:endParaRPr lang="en-US" sz="1801" dirty="0">
+              <a:solidFill>
+                <a:schemeClr val="dk1"/>
+              </a:solidFill>
+            </a:endParaRPr>
+          </a:p>
+        </p:txBody>
+      </p:sp>
+      <p:sp>
+        <p:nvSpPr>
+          <p:cNvPr id="8" name="Oval 7"/>
+          <p:cNvSpPr/>
+          <p:nvPr/>
+        </p:nvSpPr>
+        <p:spPr>
+          <a:xfrm>
+            <a:off x="2599871" y="2719613"/>
+            <a:ext cx="317500" cy="317500"/>
+          </a:xfrm>
+          <a:prstGeom prst="ellipse">
+            <a:avLst/>
+          </a:prstGeom>
+        </p:spPr>
+        <p:style>
+          <a:lnRef idx="2">
+            <a:schemeClr val="dk1"/>
+          </a:lnRef>
+          <a:fillRef idx="1">
+            <a:schemeClr val="lt1"/>
+          </a:fillRef>
+          <a:effectRef idx="0">
+            <a:schemeClr val="dk1"/>
+          </a:effectRef>
+          <a:fontRef idx="minor">
+            <a:schemeClr val="dk1"/>
+          </a:fontRef>
+        </p:style>
+        <p:txBody>
+          <a:bodyPr rtlCol="0" anchor="ctr"/>
+          <a:lstStyle/>
+          <a:p>
+            <a:pPr algn="ctr"/>
+            <a:r>
+              <a:rPr lang="en-US" sz="1801"/>
+              <a:t>5</a:t>
+            </a:r>
+            <a:endParaRPr lang="en-US" sz="1801" dirty="0">
+              <a:solidFill>
+                <a:schemeClr val="dk1"/>
+              </a:solidFill>
+            </a:endParaRPr>
+          </a:p>
+        </p:txBody>
+      </p:sp>
+      <p:sp>
+        <p:nvSpPr>
+          <p:cNvPr id="10" name="Oval 9"/>
+          <p:cNvSpPr/>
+          <p:nvPr/>
+        </p:nvSpPr>
+        <p:spPr>
+          <a:xfrm>
+            <a:off x="2133600" y="3209468"/>
+            <a:ext cx="317500" cy="317500"/>
+          </a:xfrm>
+          <a:prstGeom prst="ellipse">
+            <a:avLst/>
+          </a:prstGeom>
+        </p:spPr>
+        <p:style>
+          <a:lnRef idx="2">
+            <a:schemeClr val="dk1"/>
+          </a:lnRef>
+          <a:fillRef idx="1">
+            <a:schemeClr val="lt1"/>
+          </a:fillRef>
+          <a:effectRef idx="0">
+            <a:schemeClr val="dk1"/>
+          </a:effectRef>
+          <a:fontRef idx="minor">
+            <a:schemeClr val="dk1"/>
+          </a:fontRef>
+        </p:style>
+        <p:txBody>
+          <a:bodyPr rtlCol="0" anchor="ctr"/>
+          <a:lstStyle/>
+          <a:p>
+            <a:pPr algn="ctr"/>
+            <a:r>
+              <a:rPr lang="en-US" sz="1801" dirty="0" smtClean="0">
+                <a:solidFill>
+                  <a:schemeClr val="dk1"/>
+                </a:solidFill>
+              </a:rPr>
+              <a:t>6</a:t>
+            </a:r>
+            <a:endParaRPr lang="en-US" sz="1801" dirty="0">
+              <a:solidFill>
+                <a:schemeClr val="dk1"/>
+              </a:solidFill>
+            </a:endParaRPr>
+          </a:p>
+        </p:txBody>
+      </p:sp>
+      <p:sp>
+        <p:nvSpPr>
+          <p:cNvPr id="11" name="Oval 10"/>
+          <p:cNvSpPr/>
+          <p:nvPr/>
+        </p:nvSpPr>
+        <p:spPr>
+          <a:xfrm>
+            <a:off x="3122386" y="3209468"/>
+            <a:ext cx="317500" cy="317500"/>
+          </a:xfrm>
+          <a:prstGeom prst="ellipse">
+            <a:avLst/>
+          </a:prstGeom>
+        </p:spPr>
+        <p:style>
+          <a:lnRef idx="2">
+            <a:schemeClr val="dk1"/>
+          </a:lnRef>
+          <a:fillRef idx="1">
+            <a:schemeClr val="lt1"/>
+          </a:fillRef>
+          <a:effectRef idx="0">
+            <a:schemeClr val="dk1"/>
+          </a:effectRef>
+          <a:fontRef idx="minor">
+            <a:schemeClr val="dk1"/>
+          </a:fontRef>
+        </p:style>
+        <p:txBody>
+          <a:bodyPr rtlCol="0" anchor="ctr"/>
+          <a:lstStyle/>
+          <a:p>
+            <a:pPr algn="ctr"/>
+            <a:r>
+              <a:rPr lang="en-US" sz="1801" smtClean="0">
+                <a:solidFill>
+                  <a:schemeClr val="dk1"/>
+                </a:solidFill>
+              </a:rPr>
+              <a:t>7</a:t>
+            </a:r>
+            <a:endParaRPr lang="en-US" sz="1801" dirty="0">
+              <a:solidFill>
+                <a:schemeClr val="dk1"/>
+              </a:solidFill>
+            </a:endParaRPr>
+          </a:p>
+        </p:txBody>
+      </p:sp>
+      <p:sp>
+        <p:nvSpPr>
+          <p:cNvPr id="12" name="Oval 11"/>
+          <p:cNvSpPr/>
+          <p:nvPr/>
+        </p:nvSpPr>
+        <p:spPr>
+          <a:xfrm>
+            <a:off x="1621740" y="3741057"/>
+            <a:ext cx="317500" cy="317500"/>
+          </a:xfrm>
+          <a:prstGeom prst="ellipse">
+            <a:avLst/>
+          </a:prstGeom>
+        </p:spPr>
+        <p:style>
+          <a:lnRef idx="2">
+            <a:schemeClr val="dk1"/>
+          </a:lnRef>
+          <a:fillRef idx="1">
+            <a:schemeClr val="lt1"/>
+          </a:fillRef>
+          <a:effectRef idx="0">
+            <a:schemeClr val="dk1"/>
+          </a:effectRef>
+          <a:fontRef idx="minor">
+            <a:schemeClr val="dk1"/>
+          </a:fontRef>
+        </p:style>
+        <p:txBody>
+          <a:bodyPr rtlCol="0" anchor="ctr"/>
+          <a:lstStyle/>
+          <a:p>
+            <a:pPr algn="ctr"/>
+            <a:r>
+              <a:rPr lang="en-US" sz="1801" dirty="0" smtClean="0">
+                <a:solidFill>
+                  <a:schemeClr val="dk1"/>
+                </a:solidFill>
+              </a:rPr>
+              <a:t>8</a:t>
+            </a:r>
+            <a:endParaRPr lang="en-US" sz="1801" dirty="0">
+              <a:solidFill>
+                <a:schemeClr val="dk1"/>
+              </a:solidFill>
+            </a:endParaRPr>
+          </a:p>
+        </p:txBody>
+      </p:sp>
+      <p:sp>
+        <p:nvSpPr>
+          <p:cNvPr id="13" name="Oval 12"/>
+          <p:cNvSpPr/>
+          <p:nvPr/>
+        </p:nvSpPr>
+        <p:spPr>
+          <a:xfrm>
+            <a:off x="3677556" y="3741057"/>
+            <a:ext cx="317500" cy="317500"/>
+          </a:xfrm>
+          <a:prstGeom prst="ellipse">
+            <a:avLst/>
+          </a:prstGeom>
+        </p:spPr>
+        <p:style>
+          <a:lnRef idx="2">
+            <a:schemeClr val="dk1"/>
+          </a:lnRef>
+          <a:fillRef idx="1">
+            <a:schemeClr val="lt1"/>
+          </a:fillRef>
+          <a:effectRef idx="0">
+            <a:schemeClr val="dk1"/>
+          </a:effectRef>
+          <a:fontRef idx="minor">
+            <a:schemeClr val="dk1"/>
+          </a:fontRef>
+        </p:style>
+        <p:txBody>
+          <a:bodyPr rtlCol="0" anchor="ctr"/>
+          <a:lstStyle/>
+          <a:p>
+            <a:pPr algn="ctr"/>
+            <a:r>
+              <a:rPr lang="en-US" sz="1801" smtClean="0">
+                <a:solidFill>
+                  <a:schemeClr val="dk1"/>
+                </a:solidFill>
+              </a:rPr>
+              <a:t>9</a:t>
+            </a:r>
+            <a:endParaRPr lang="en-US" sz="1801" dirty="0">
+              <a:solidFill>
+                <a:schemeClr val="dk1"/>
+              </a:solidFill>
+            </a:endParaRPr>
+          </a:p>
+        </p:txBody>
+      </p:sp>
+      <p:cxnSp>
+        <p:nvCxnSpPr>
+          <p:cNvPr id="14" name="Straight Arrow Connector 13"/>
+          <p:cNvCxnSpPr>
+            <a:stCxn id="4" idx="3"/>
+            <a:endCxn id="5" idx="0"/>
+          </p:cNvCxnSpPr>
+          <p:nvPr/>
+        </p:nvCxnSpPr>
+        <p:spPr>
+          <a:xfrm flipH="1">
+            <a:off x="1789792" y="1564587"/>
+            <a:ext cx="368533" cy="214318"/>
+          </a:xfrm>
+          <a:prstGeom prst="straightConnector1">
+            <a:avLst/>
+          </a:prstGeom>
+          <a:ln>
+            <a:tailEnd type="none"/>
+          </a:ln>
+        </p:spPr>
+        <p:style>
+          <a:lnRef idx="2">
+            <a:schemeClr val="dk1"/>
+          </a:lnRef>
+          <a:fillRef idx="0">
+            <a:schemeClr val="dk1"/>
+          </a:fillRef>
+          <a:effectRef idx="1">
+            <a:schemeClr val="dk1"/>
+          </a:effectRef>
+          <a:fontRef idx="minor">
+            <a:schemeClr val="tx1"/>
+          </a:fontRef>
+        </p:style>
+      </p:cxnSp>
+      <p:cxnSp>
+        <p:nvCxnSpPr>
+          <p:cNvPr id="18" name="Straight Arrow Connector 17"/>
+          <p:cNvCxnSpPr>
+            <a:stCxn id="5" idx="5"/>
+            <a:endCxn id="7" idx="0"/>
+          </p:cNvCxnSpPr>
+          <p:nvPr/>
+        </p:nvCxnSpPr>
+        <p:spPr>
+          <a:xfrm>
+            <a:off x="1902045" y="2049908"/>
+            <a:ext cx="335875" cy="179846"/>
+          </a:xfrm>
+          <a:prstGeom prst="straightConnector1">
+            <a:avLst/>
+          </a:prstGeom>
+          <a:ln>
+            <a:tailEnd type="none"/>
+          </a:ln>
+        </p:spPr>
+        <p:style>
+          <a:lnRef idx="2">
+            <a:schemeClr val="dk1"/>
+          </a:lnRef>
+          <a:fillRef idx="0">
+            <a:schemeClr val="dk1"/>
+          </a:fillRef>
+          <a:effectRef idx="1">
+            <a:schemeClr val="dk1"/>
+          </a:effectRef>
+          <a:fontRef idx="minor">
+            <a:schemeClr val="tx1"/>
+          </a:fontRef>
+        </p:style>
+      </p:cxnSp>
+      <p:cxnSp>
+        <p:nvCxnSpPr>
+          <p:cNvPr id="22" name="Straight Arrow Connector 21"/>
+          <p:cNvCxnSpPr>
+            <a:stCxn id="8" idx="0"/>
+            <a:endCxn id="7" idx="5"/>
+          </p:cNvCxnSpPr>
+          <p:nvPr/>
+        </p:nvCxnSpPr>
+        <p:spPr>
+          <a:xfrm flipH="1" flipV="1">
+            <a:off x="2350173" y="2500757"/>
+            <a:ext cx="408448" cy="218856"/>
+          </a:xfrm>
+          <a:prstGeom prst="straightConnector1">
+            <a:avLst/>
+          </a:prstGeom>
+          <a:ln>
+            <a:tailEnd type="none"/>
+          </a:ln>
+        </p:spPr>
+        <p:style>
+          <a:lnRef idx="2">
+            <a:schemeClr val="dk1"/>
+          </a:lnRef>
+          <a:fillRef idx="0">
+            <a:schemeClr val="dk1"/>
+          </a:fillRef>
+          <a:effectRef idx="1">
+            <a:schemeClr val="dk1"/>
+          </a:effectRef>
+          <a:fontRef idx="minor">
+            <a:schemeClr val="tx1"/>
+          </a:fontRef>
+        </p:style>
+      </p:cxnSp>
+      <p:cxnSp>
+        <p:nvCxnSpPr>
+          <p:cNvPr id="26" name="Straight Arrow Connector 25"/>
+          <p:cNvCxnSpPr>
+            <a:stCxn id="8" idx="3"/>
+            <a:endCxn id="10" idx="0"/>
+          </p:cNvCxnSpPr>
+          <p:nvPr/>
+        </p:nvCxnSpPr>
+        <p:spPr>
+          <a:xfrm flipH="1">
+            <a:off x="2292350" y="2990616"/>
+            <a:ext cx="354018" cy="218852"/>
+          </a:xfrm>
+          <a:prstGeom prst="straightConnector1">
+            <a:avLst/>
+          </a:prstGeom>
+          <a:ln>
+            <a:tailEnd type="none"/>
+          </a:ln>
+        </p:spPr>
+        <p:style>
+          <a:lnRef idx="2">
+            <a:schemeClr val="dk1"/>
+          </a:lnRef>
+          <a:fillRef idx="0">
+            <a:schemeClr val="dk1"/>
+          </a:fillRef>
+          <a:effectRef idx="1">
+            <a:schemeClr val="dk1"/>
+          </a:effectRef>
+          <a:fontRef idx="minor">
+            <a:schemeClr val="tx1"/>
+          </a:fontRef>
+        </p:style>
+      </p:cxnSp>
+      <p:cxnSp>
+        <p:nvCxnSpPr>
+          <p:cNvPr id="29" name="Straight Arrow Connector 28"/>
+          <p:cNvCxnSpPr>
+            <a:stCxn id="8" idx="5"/>
+            <a:endCxn id="11" idx="0"/>
+          </p:cNvCxnSpPr>
+          <p:nvPr/>
+        </p:nvCxnSpPr>
+        <p:spPr>
+          <a:xfrm>
+            <a:off x="2870874" y="2990616"/>
+            <a:ext cx="410262" cy="218852"/>
+          </a:xfrm>
+          <a:prstGeom prst="straightConnector1">
+            <a:avLst/>
+          </a:prstGeom>
+          <a:ln>
+            <a:tailEnd type="none"/>
+          </a:ln>
+        </p:spPr>
+        <p:style>
+          <a:lnRef idx="2">
+            <a:schemeClr val="dk1"/>
+          </a:lnRef>
+          <a:fillRef idx="0">
+            <a:schemeClr val="dk1"/>
+          </a:fillRef>
+          <a:effectRef idx="1">
+            <a:schemeClr val="dk1"/>
+          </a:effectRef>
+          <a:fontRef idx="minor">
+            <a:schemeClr val="tx1"/>
+          </a:fontRef>
+        </p:style>
+      </p:cxnSp>
+      <p:cxnSp>
+        <p:nvCxnSpPr>
+          <p:cNvPr id="32" name="Straight Arrow Connector 31"/>
+          <p:cNvCxnSpPr>
+            <a:stCxn id="10" idx="3"/>
+            <a:endCxn id="12" idx="0"/>
+          </p:cNvCxnSpPr>
+          <p:nvPr/>
+        </p:nvCxnSpPr>
+        <p:spPr>
+          <a:xfrm flipH="1">
+            <a:off x="1780490" y="3480471"/>
+            <a:ext cx="399607" cy="260586"/>
+          </a:xfrm>
+          <a:prstGeom prst="straightConnector1">
+            <a:avLst/>
+          </a:prstGeom>
+          <a:ln>
+            <a:tailEnd type="none"/>
+          </a:ln>
+        </p:spPr>
+        <p:style>
+          <a:lnRef idx="2">
+            <a:schemeClr val="dk1"/>
+          </a:lnRef>
+          <a:fillRef idx="0">
+            <a:schemeClr val="dk1"/>
+          </a:fillRef>
+          <a:effectRef idx="1">
+            <a:schemeClr val="dk1"/>
+          </a:effectRef>
+          <a:fontRef idx="minor">
+            <a:schemeClr val="tx1"/>
+          </a:fontRef>
+        </p:style>
+      </p:cxnSp>
+      <p:cxnSp>
+        <p:nvCxnSpPr>
+          <p:cNvPr id="37" name="Straight Arrow Connector 36"/>
+          <p:cNvCxnSpPr>
+            <a:stCxn id="11" idx="5"/>
+            <a:endCxn id="13" idx="0"/>
+          </p:cNvCxnSpPr>
+          <p:nvPr/>
+        </p:nvCxnSpPr>
+        <p:spPr>
+          <a:xfrm>
+            <a:off x="3393389" y="3480471"/>
+            <a:ext cx="442917" cy="260586"/>
+          </a:xfrm>
+          <a:prstGeom prst="straightConnector1">
+            <a:avLst/>
+          </a:prstGeom>
+          <a:ln>
+            <a:tailEnd type="none"/>
+          </a:ln>
+        </p:spPr>
+        <p:style>
+          <a:lnRef idx="2">
+            <a:schemeClr val="dk1"/>
+          </a:lnRef>
+          <a:fillRef idx="0">
+            <a:schemeClr val="dk1"/>
+          </a:fillRef>
+          <a:effectRef idx="1">
+            <a:schemeClr val="dk1"/>
+          </a:effectRef>
+          <a:fontRef idx="minor">
+            <a:schemeClr val="tx1"/>
+          </a:fontRef>
+        </p:style>
+      </p:cxnSp>
+      <p:sp>
+        <p:nvSpPr>
+          <p:cNvPr id="17" name="Oval 16"/>
+          <p:cNvSpPr/>
+          <p:nvPr/>
+        </p:nvSpPr>
+        <p:spPr>
+          <a:xfrm>
+            <a:off x="5998028" y="1461405"/>
+            <a:ext cx="317500" cy="317500"/>
+          </a:xfrm>
+          <a:prstGeom prst="ellipse">
+            <a:avLst/>
+          </a:prstGeom>
+        </p:spPr>
+        <p:style>
+          <a:lnRef idx="2">
+            <a:schemeClr val="dk1"/>
+          </a:lnRef>
+          <a:fillRef idx="1">
+            <a:schemeClr val="lt1"/>
+          </a:fillRef>
+          <a:effectRef idx="0">
+            <a:schemeClr val="dk1"/>
+          </a:effectRef>
+          <a:fontRef idx="minor">
+            <a:schemeClr val="dk1"/>
+          </a:fontRef>
+        </p:style>
+        <p:txBody>
+          <a:bodyPr rtlCol="0" anchor="ctr"/>
+          <a:lstStyle/>
+          <a:p>
+            <a:pPr algn="ctr"/>
+            <a:r>
+              <a:rPr lang="en-US" sz="1801" dirty="0">
+                <a:solidFill>
+                  <a:schemeClr val="dk1"/>
+                </a:solidFill>
+              </a:rPr>
+              <a:t>1</a:t>
+            </a:r>
+          </a:p>
+        </p:txBody>
+      </p:sp>
+      <p:sp>
+        <p:nvSpPr>
+          <p:cNvPr id="19" name="Oval 18"/>
+          <p:cNvSpPr/>
+          <p:nvPr/>
+        </p:nvSpPr>
+        <p:spPr>
+          <a:xfrm>
+            <a:off x="6475185" y="1946726"/>
+            <a:ext cx="317500" cy="317500"/>
+          </a:xfrm>
+          <a:prstGeom prst="ellipse">
+            <a:avLst/>
+          </a:prstGeom>
+        </p:spPr>
+        <p:style>
+          <a:lnRef idx="2">
+            <a:schemeClr val="dk1"/>
+          </a:lnRef>
+          <a:fillRef idx="1">
+            <a:schemeClr val="lt1"/>
+          </a:fillRef>
+          <a:effectRef idx="0">
+            <a:schemeClr val="dk1"/>
+          </a:effectRef>
+          <a:fontRef idx="minor">
+            <a:schemeClr val="dk1"/>
+          </a:fontRef>
+        </p:style>
+        <p:txBody>
+          <a:bodyPr rtlCol="0" anchor="ctr"/>
+          <a:lstStyle/>
+          <a:p>
+            <a:pPr algn="ctr"/>
+            <a:r>
+              <a:rPr lang="en-US" sz="1801" dirty="0" smtClean="0"/>
+              <a:t>2</a:t>
+            </a:r>
+            <a:endParaRPr lang="en-US" sz="1801" dirty="0">
+              <a:solidFill>
+                <a:schemeClr val="dk1"/>
+              </a:solidFill>
+            </a:endParaRPr>
+          </a:p>
+        </p:txBody>
+      </p:sp>
+      <p:cxnSp>
+        <p:nvCxnSpPr>
+          <p:cNvPr id="20" name="Straight Arrow Connector 19"/>
+          <p:cNvCxnSpPr>
+            <a:stCxn id="17" idx="5"/>
+            <a:endCxn id="19" idx="0"/>
+          </p:cNvCxnSpPr>
+          <p:nvPr/>
+        </p:nvCxnSpPr>
+        <p:spPr>
+          <a:xfrm>
+            <a:off x="6269031" y="1732408"/>
+            <a:ext cx="364904" cy="214318"/>
+          </a:xfrm>
+          <a:prstGeom prst="straightConnector1">
+            <a:avLst/>
+          </a:prstGeom>
+          <a:ln>
+            <a:tailEnd type="none"/>
+          </a:ln>
+        </p:spPr>
+        <p:style>
+          <a:lnRef idx="2">
+            <a:schemeClr val="dk1"/>
+          </a:lnRef>
+          <a:fillRef idx="0">
+            <a:schemeClr val="dk1"/>
+          </a:fillRef>
+          <a:effectRef idx="1">
+            <a:schemeClr val="dk1"/>
+          </a:effectRef>
+          <a:fontRef idx="minor">
+            <a:schemeClr val="tx1"/>
+          </a:fontRef>
+        </p:style>
+      </p:cxnSp>
+      <p:sp>
+        <p:nvSpPr>
+          <p:cNvPr id="56" name="Oval 55"/>
+          <p:cNvSpPr/>
+          <p:nvPr/>
+        </p:nvSpPr>
+        <p:spPr>
+          <a:xfrm>
+            <a:off x="1621740" y="5703209"/>
+            <a:ext cx="317500" cy="317500"/>
+          </a:xfrm>
+          <a:prstGeom prst="ellipse">
+            <a:avLst/>
+          </a:prstGeom>
+        </p:spPr>
+        <p:style>
+          <a:lnRef idx="2">
+            <a:schemeClr val="dk1"/>
+          </a:lnRef>
+          <a:fillRef idx="1">
+            <a:schemeClr val="lt1"/>
+          </a:fillRef>
+          <a:effectRef idx="0">
+            <a:schemeClr val="dk1"/>
+          </a:effectRef>
+          <a:fontRef idx="minor">
+            <a:schemeClr val="dk1"/>
+          </a:fontRef>
+        </p:style>
+        <p:txBody>
+          <a:bodyPr rtlCol="0" anchor="ctr"/>
+          <a:lstStyle/>
+          <a:p>
+            <a:pPr algn="ctr"/>
+            <a:r>
+              <a:rPr lang="en-US" sz="1801" dirty="0"/>
+              <a:t>0</a:t>
+            </a:r>
+            <a:endParaRPr lang="en-US" sz="1801" dirty="0">
+              <a:solidFill>
+                <a:schemeClr val="dk1"/>
+              </a:solidFill>
+            </a:endParaRPr>
+          </a:p>
+        </p:txBody>
+      </p:sp>
+      <p:sp>
+        <p:nvSpPr>
+          <p:cNvPr id="57" name="Oval 56"/>
+          <p:cNvSpPr/>
+          <p:nvPr/>
+        </p:nvSpPr>
+        <p:spPr>
+          <a:xfrm>
+            <a:off x="3122386" y="5703209"/>
+            <a:ext cx="317500" cy="317500"/>
+          </a:xfrm>
+          <a:prstGeom prst="ellipse">
+            <a:avLst/>
+          </a:prstGeom>
+        </p:spPr>
+        <p:style>
+          <a:lnRef idx="2">
+            <a:schemeClr val="dk1"/>
+          </a:lnRef>
+          <a:fillRef idx="1">
+            <a:schemeClr val="lt1"/>
+          </a:fillRef>
+          <a:effectRef idx="0">
+            <a:schemeClr val="dk1"/>
+          </a:effectRef>
+          <a:fontRef idx="minor">
+            <a:schemeClr val="dk1"/>
+          </a:fontRef>
+        </p:style>
+        <p:txBody>
+          <a:bodyPr rtlCol="0" anchor="ctr"/>
+          <a:lstStyle/>
+          <a:p>
+            <a:pPr algn="ctr"/>
+            <a:r>
+              <a:rPr lang="en-US" sz="1801" dirty="0" smtClean="0"/>
+              <a:t>1</a:t>
+            </a:r>
+            <a:endParaRPr lang="en-US" sz="1801" dirty="0">
+              <a:solidFill>
+                <a:schemeClr val="dk1"/>
+              </a:solidFill>
+            </a:endParaRPr>
+          </a:p>
+        </p:txBody>
+      </p:sp>
+      <p:sp>
+        <p:nvSpPr>
+          <p:cNvPr id="58" name="Oval 57"/>
+          <p:cNvSpPr/>
+          <p:nvPr/>
+        </p:nvSpPr>
+        <p:spPr>
+          <a:xfrm>
+            <a:off x="1621740" y="7169254"/>
+            <a:ext cx="317500" cy="317500"/>
+          </a:xfrm>
+          <a:prstGeom prst="ellipse">
+            <a:avLst/>
+          </a:prstGeom>
+        </p:spPr>
+        <p:style>
+          <a:lnRef idx="2">
+            <a:schemeClr val="dk1"/>
+          </a:lnRef>
+          <a:fillRef idx="1">
+            <a:schemeClr val="lt1"/>
+          </a:fillRef>
+          <a:effectRef idx="0">
+            <a:schemeClr val="dk1"/>
+          </a:effectRef>
+          <a:fontRef idx="minor">
+            <a:schemeClr val="dk1"/>
+          </a:fontRef>
+        </p:style>
+        <p:txBody>
+          <a:bodyPr rtlCol="0" anchor="ctr"/>
+          <a:lstStyle/>
+          <a:p>
+            <a:pPr algn="ctr"/>
+            <a:r>
+              <a:rPr lang="en-US" sz="1801" dirty="0" smtClean="0"/>
+              <a:t>2</a:t>
+            </a:r>
+          </a:p>
+        </p:txBody>
+      </p:sp>
+      <p:sp>
+        <p:nvSpPr>
+          <p:cNvPr id="59" name="Oval 58"/>
+          <p:cNvSpPr/>
+          <p:nvPr/>
+        </p:nvSpPr>
+        <p:spPr>
+          <a:xfrm>
+            <a:off x="3122386" y="7169254"/>
+            <a:ext cx="317500" cy="317500"/>
+          </a:xfrm>
+          <a:prstGeom prst="ellipse">
+            <a:avLst/>
+          </a:prstGeom>
+        </p:spPr>
+        <p:style>
+          <a:lnRef idx="2">
+            <a:schemeClr val="dk1"/>
+          </a:lnRef>
+          <a:fillRef idx="1">
+            <a:schemeClr val="lt1"/>
+          </a:fillRef>
+          <a:effectRef idx="0">
+            <a:schemeClr val="dk1"/>
+          </a:effectRef>
+          <a:fontRef idx="minor">
+            <a:schemeClr val="dk1"/>
+          </a:fontRef>
+        </p:style>
+        <p:txBody>
+          <a:bodyPr rtlCol="0" anchor="ctr"/>
+          <a:lstStyle/>
+          <a:p>
+            <a:pPr algn="ctr"/>
+            <a:r>
+              <a:rPr lang="en-US" sz="1801" dirty="0" smtClean="0"/>
+              <a:t>3</a:t>
+            </a:r>
+          </a:p>
+        </p:txBody>
+      </p:sp>
+      <p:cxnSp>
+        <p:nvCxnSpPr>
+          <p:cNvPr id="60" name="Straight Arrow Connector 59"/>
+          <p:cNvCxnSpPr>
+            <a:stCxn id="56" idx="6"/>
+            <a:endCxn id="57" idx="2"/>
+          </p:cNvCxnSpPr>
+          <p:nvPr/>
+        </p:nvCxnSpPr>
+        <p:spPr>
+          <a:xfrm>
+            <a:off x="1939240" y="5861959"/>
+            <a:ext cx="1183146" cy="0"/>
+          </a:xfrm>
+          <a:prstGeom prst="straightConnector1">
+            <a:avLst/>
+          </a:prstGeom>
+          <a:ln>
+            <a:tailEnd type="triangle"/>
+          </a:ln>
+        </p:spPr>
+        <p:style>
+          <a:lnRef idx="2">
+            <a:schemeClr val="dk1"/>
+          </a:lnRef>
+          <a:fillRef idx="0">
+            <a:schemeClr val="dk1"/>
+          </a:fillRef>
+          <a:effectRef idx="1">
+            <a:schemeClr val="dk1"/>
+          </a:effectRef>
+          <a:fontRef idx="minor">
+            <a:schemeClr val="tx1"/>
+          </a:fontRef>
+        </p:style>
+      </p:cxnSp>
+      <p:cxnSp>
+        <p:nvCxnSpPr>
+          <p:cNvPr id="64" name="Straight Arrow Connector 63"/>
+          <p:cNvCxnSpPr>
+            <a:stCxn id="56" idx="4"/>
+            <a:endCxn id="58" idx="0"/>
+          </p:cNvCxnSpPr>
+          <p:nvPr/>
+        </p:nvCxnSpPr>
+        <p:spPr>
+          <a:xfrm>
+            <a:off x="1780490" y="6020709"/>
+            <a:ext cx="0" cy="1148545"/>
+          </a:xfrm>
+          <a:prstGeom prst="straightConnector1">
+            <a:avLst/>
+          </a:prstGeom>
+          <a:ln>
+            <a:tailEnd type="triangle"/>
+          </a:ln>
+        </p:spPr>
+        <p:style>
+          <a:lnRef idx="2">
+            <a:schemeClr val="dk1"/>
+          </a:lnRef>
+          <a:fillRef idx="0">
+            <a:schemeClr val="dk1"/>
+          </a:fillRef>
+          <a:effectRef idx="1">
+            <a:schemeClr val="dk1"/>
+          </a:effectRef>
+          <a:fontRef idx="minor">
+            <a:schemeClr val="tx1"/>
+          </a:fontRef>
+        </p:style>
+      </p:cxnSp>
+      <p:cxnSp>
+        <p:nvCxnSpPr>
+          <p:cNvPr id="68" name="Straight Arrow Connector 67"/>
+          <p:cNvCxnSpPr>
+            <a:stCxn id="58" idx="6"/>
+            <a:endCxn id="59" idx="2"/>
+          </p:cNvCxnSpPr>
+          <p:nvPr/>
+        </p:nvCxnSpPr>
+        <p:spPr>
+          <a:xfrm>
+            <a:off x="1939240" y="7328004"/>
+            <a:ext cx="1183146" cy="0"/>
+          </a:xfrm>
+          <a:prstGeom prst="straightConnector1">
+            <a:avLst/>
+          </a:prstGeom>
+          <a:ln>
+            <a:tailEnd type="triangle"/>
+          </a:ln>
+        </p:spPr>
+        <p:style>
+          <a:lnRef idx="2">
+            <a:schemeClr val="dk1"/>
+          </a:lnRef>
+          <a:fillRef idx="0">
+            <a:schemeClr val="dk1"/>
+          </a:fillRef>
+          <a:effectRef idx="1">
+            <a:schemeClr val="dk1"/>
+          </a:effectRef>
+          <a:fontRef idx="minor">
+            <a:schemeClr val="tx1"/>
+          </a:fontRef>
+        </p:style>
+      </p:cxnSp>
+      <p:cxnSp>
+        <p:nvCxnSpPr>
+          <p:cNvPr id="72" name="Straight Arrow Connector 71"/>
+          <p:cNvCxnSpPr>
+            <a:stCxn id="59" idx="1"/>
+            <a:endCxn id="56" idx="5"/>
+          </p:cNvCxnSpPr>
+          <p:nvPr/>
+        </p:nvCxnSpPr>
+        <p:spPr>
+          <a:xfrm flipH="1" flipV="1">
+            <a:off x="1892743" y="5974212"/>
+            <a:ext cx="1276140" cy="1241539"/>
+          </a:xfrm>
+          <a:prstGeom prst="straightConnector1">
+            <a:avLst/>
+          </a:prstGeom>
+          <a:ln>
+            <a:tailEnd type="triangle"/>
+          </a:ln>
+        </p:spPr>
+        <p:style>
+          <a:lnRef idx="2">
+            <a:schemeClr val="dk1"/>
+          </a:lnRef>
+          <a:fillRef idx="0">
+            <a:schemeClr val="dk1"/>
+          </a:fillRef>
+          <a:effectRef idx="1">
+            <a:schemeClr val="dk1"/>
+          </a:effectRef>
+          <a:fontRef idx="minor">
+            <a:schemeClr val="tx1"/>
+          </a:fontRef>
+        </p:style>
+      </p:cxnSp>
+      <p:sp>
+        <p:nvSpPr>
+          <p:cNvPr id="83" name="Oval 82"/>
+          <p:cNvSpPr/>
+          <p:nvPr/>
+        </p:nvSpPr>
+        <p:spPr>
+          <a:xfrm>
+            <a:off x="5406455" y="5703209"/>
+            <a:ext cx="317500" cy="317500"/>
+          </a:xfrm>
+          <a:prstGeom prst="ellipse">
+            <a:avLst/>
+          </a:prstGeom>
+        </p:spPr>
+        <p:style>
+          <a:lnRef idx="2">
+            <a:schemeClr val="dk1"/>
+          </a:lnRef>
+          <a:fillRef idx="1">
+            <a:schemeClr val="lt1"/>
+          </a:fillRef>
+          <a:effectRef idx="0">
+            <a:schemeClr val="dk1"/>
+          </a:effectRef>
+          <a:fontRef idx="minor">
+            <a:schemeClr val="dk1"/>
+          </a:fontRef>
+        </p:style>
+        <p:txBody>
+          <a:bodyPr rtlCol="0" anchor="ctr"/>
+          <a:lstStyle/>
+          <a:p>
+            <a:pPr algn="ctr"/>
+            <a:r>
+              <a:rPr lang="en-US" sz="1801" dirty="0"/>
+              <a:t>0</a:t>
+            </a:r>
+            <a:endParaRPr lang="en-US" sz="1801" dirty="0">
+              <a:solidFill>
+                <a:schemeClr val="dk1"/>
+              </a:solidFill>
+            </a:endParaRPr>
+          </a:p>
+        </p:txBody>
+      </p:sp>
+      <p:sp>
+        <p:nvSpPr>
+          <p:cNvPr id="84" name="Oval 83"/>
+          <p:cNvSpPr/>
+          <p:nvPr/>
+        </p:nvSpPr>
+        <p:spPr>
+          <a:xfrm>
+            <a:off x="6907101" y="5703209"/>
+            <a:ext cx="317500" cy="317500"/>
+          </a:xfrm>
+          <a:prstGeom prst="ellipse">
+            <a:avLst/>
+          </a:prstGeom>
+        </p:spPr>
+        <p:style>
+          <a:lnRef idx="2">
+            <a:schemeClr val="dk1"/>
+          </a:lnRef>
+          <a:fillRef idx="1">
+            <a:schemeClr val="lt1"/>
+          </a:fillRef>
+          <a:effectRef idx="0">
+            <a:schemeClr val="dk1"/>
+          </a:effectRef>
+          <a:fontRef idx="minor">
+            <a:schemeClr val="dk1"/>
+          </a:fontRef>
+        </p:style>
+        <p:txBody>
+          <a:bodyPr rtlCol="0" anchor="ctr"/>
+          <a:lstStyle/>
+          <a:p>
+            <a:pPr algn="ctr"/>
+            <a:r>
+              <a:rPr lang="en-US" sz="1801" dirty="0" smtClean="0"/>
+              <a:t>1</a:t>
+            </a:r>
+            <a:endParaRPr lang="en-US" sz="1801" dirty="0">
+              <a:solidFill>
+                <a:schemeClr val="dk1"/>
+              </a:solidFill>
+            </a:endParaRPr>
+          </a:p>
+        </p:txBody>
+      </p:sp>
+      <p:sp>
+        <p:nvSpPr>
+          <p:cNvPr id="85" name="Oval 84"/>
+          <p:cNvSpPr/>
+          <p:nvPr/>
+        </p:nvSpPr>
+        <p:spPr>
+          <a:xfrm>
+            <a:off x="5406455" y="7169254"/>
+            <a:ext cx="317500" cy="317500"/>
+          </a:xfrm>
+          <a:prstGeom prst="ellipse">
+            <a:avLst/>
+          </a:prstGeom>
+        </p:spPr>
+        <p:style>
+          <a:lnRef idx="2">
+            <a:schemeClr val="dk1"/>
+          </a:lnRef>
+          <a:fillRef idx="1">
+            <a:schemeClr val="lt1"/>
+          </a:fillRef>
+          <a:effectRef idx="0">
+            <a:schemeClr val="dk1"/>
+          </a:effectRef>
+          <a:fontRef idx="minor">
+            <a:schemeClr val="dk1"/>
+          </a:fontRef>
+        </p:style>
+        <p:txBody>
+          <a:bodyPr rtlCol="0" anchor="ctr"/>
+          <a:lstStyle/>
+          <a:p>
+            <a:pPr algn="ctr"/>
+            <a:r>
+              <a:rPr lang="en-US" sz="1801" dirty="0" smtClean="0"/>
+              <a:t>2</a:t>
+            </a:r>
+          </a:p>
+        </p:txBody>
+      </p:sp>
+      <p:sp>
+        <p:nvSpPr>
+          <p:cNvPr id="86" name="Oval 85"/>
+          <p:cNvSpPr/>
+          <p:nvPr/>
+        </p:nvSpPr>
+        <p:spPr>
+          <a:xfrm>
+            <a:off x="6907101" y="7169254"/>
+            <a:ext cx="317500" cy="317500"/>
+          </a:xfrm>
+          <a:prstGeom prst="ellipse">
+            <a:avLst/>
+          </a:prstGeom>
+        </p:spPr>
+        <p:style>
+          <a:lnRef idx="2">
+            <a:schemeClr val="dk1"/>
+          </a:lnRef>
+          <a:fillRef idx="1">
+            <a:schemeClr val="lt1"/>
+          </a:fillRef>
+          <a:effectRef idx="0">
+            <a:schemeClr val="dk1"/>
+          </a:effectRef>
+          <a:fontRef idx="minor">
+            <a:schemeClr val="dk1"/>
+          </a:fontRef>
+        </p:style>
+        <p:txBody>
+          <a:bodyPr rtlCol="0" anchor="ctr"/>
+          <a:lstStyle/>
+          <a:p>
+            <a:pPr algn="ctr"/>
+            <a:r>
+              <a:rPr lang="en-US" sz="1801" dirty="0" smtClean="0"/>
+              <a:t>3</a:t>
+            </a:r>
+          </a:p>
+        </p:txBody>
+      </p:sp>
+      <p:cxnSp>
+        <p:nvCxnSpPr>
+          <p:cNvPr id="87" name="Straight Arrow Connector 86"/>
+          <p:cNvCxnSpPr>
+            <a:stCxn id="83" idx="6"/>
+            <a:endCxn id="84" idx="2"/>
+          </p:cNvCxnSpPr>
+          <p:nvPr/>
+        </p:nvCxnSpPr>
+        <p:spPr>
+          <a:xfrm>
+            <a:off x="5723955" y="5861959"/>
+            <a:ext cx="1183146" cy="0"/>
+          </a:xfrm>
+          <a:prstGeom prst="straightConnector1">
+            <a:avLst/>
+          </a:prstGeom>
+          <a:ln>
+            <a:tailEnd type="triangle"/>
+          </a:ln>
+        </p:spPr>
+        <p:style>
+          <a:lnRef idx="2">
+            <a:schemeClr val="dk1"/>
+          </a:lnRef>
+          <a:fillRef idx="0">
+            <a:schemeClr val="dk1"/>
+          </a:fillRef>
+          <a:effectRef idx="1">
+            <a:schemeClr val="dk1"/>
+          </a:effectRef>
+          <a:fontRef idx="minor">
+            <a:schemeClr val="tx1"/>
+          </a:fontRef>
+        </p:style>
+      </p:cxnSp>
+      <p:cxnSp>
+        <p:nvCxnSpPr>
+          <p:cNvPr id="88" name="Straight Arrow Connector 87"/>
+          <p:cNvCxnSpPr>
+            <a:stCxn id="83" idx="4"/>
+            <a:endCxn id="85" idx="0"/>
+          </p:cNvCxnSpPr>
+          <p:nvPr/>
+        </p:nvCxnSpPr>
+        <p:spPr>
+          <a:xfrm>
+            <a:off x="5565205" y="6020709"/>
+            <a:ext cx="0" cy="1148545"/>
+          </a:xfrm>
+          <a:prstGeom prst="straightConnector1">
+            <a:avLst/>
+          </a:prstGeom>
+          <a:ln>
+            <a:tailEnd type="triangle"/>
+          </a:ln>
+        </p:spPr>
+        <p:style>
+          <a:lnRef idx="2">
+            <a:schemeClr val="dk1"/>
+          </a:lnRef>
+          <a:fillRef idx="0">
+            <a:schemeClr val="dk1"/>
+          </a:fillRef>
+          <a:effectRef idx="1">
+            <a:schemeClr val="dk1"/>
+          </a:effectRef>
+          <a:fontRef idx="minor">
+            <a:schemeClr val="tx1"/>
+          </a:fontRef>
+        </p:style>
+      </p:cxnSp>
+      <p:cxnSp>
+        <p:nvCxnSpPr>
+          <p:cNvPr id="89" name="Straight Arrow Connector 88"/>
+          <p:cNvCxnSpPr>
+            <a:stCxn id="85" idx="6"/>
+            <a:endCxn id="86" idx="2"/>
+          </p:cNvCxnSpPr>
+          <p:nvPr/>
+        </p:nvCxnSpPr>
+        <p:spPr>
+          <a:xfrm>
+            <a:off x="5723955" y="7328004"/>
+            <a:ext cx="1183146" cy="0"/>
+          </a:xfrm>
+          <a:prstGeom prst="straightConnector1">
+            <a:avLst/>
+          </a:prstGeom>
+          <a:ln>
+            <a:tailEnd type="triangle"/>
+          </a:ln>
+        </p:spPr>
+        <p:style>
+          <a:lnRef idx="2">
+            <a:schemeClr val="dk1"/>
+          </a:lnRef>
+          <a:fillRef idx="0">
+            <a:schemeClr val="dk1"/>
+          </a:fillRef>
+          <a:effectRef idx="1">
+            <a:schemeClr val="dk1"/>
+          </a:effectRef>
+          <a:fontRef idx="minor">
+            <a:schemeClr val="tx1"/>
+          </a:fontRef>
+        </p:style>
+      </p:cxnSp>
+      <p:cxnSp>
+        <p:nvCxnSpPr>
+          <p:cNvPr id="90" name="Straight Arrow Connector 89"/>
+          <p:cNvCxnSpPr>
+            <a:stCxn id="86" idx="1"/>
+            <a:endCxn id="83" idx="5"/>
+          </p:cNvCxnSpPr>
+          <p:nvPr/>
+        </p:nvCxnSpPr>
+        <p:spPr>
+          <a:xfrm flipH="1" flipV="1">
+            <a:off x="5677458" y="5974212"/>
+            <a:ext cx="1276140" cy="1241539"/>
+          </a:xfrm>
+          <a:prstGeom prst="straightConnector1">
+            <a:avLst/>
+          </a:prstGeom>
+          <a:ln>
+            <a:tailEnd type="triangle"/>
+          </a:ln>
+        </p:spPr>
+        <p:style>
+          <a:lnRef idx="2">
+            <a:schemeClr val="dk1"/>
+          </a:lnRef>
+          <a:fillRef idx="0">
+            <a:schemeClr val="dk1"/>
+          </a:fillRef>
+          <a:effectRef idx="1">
+            <a:schemeClr val="dk1"/>
+          </a:effectRef>
+          <a:fontRef idx="minor">
+            <a:schemeClr val="tx1"/>
+          </a:fontRef>
+        </p:style>
+      </p:cxnSp>
+      <p:sp>
+        <p:nvSpPr>
+          <p:cNvPr id="100" name="Oval 99"/>
+          <p:cNvSpPr/>
+          <p:nvPr/>
+        </p:nvSpPr>
+        <p:spPr>
+          <a:xfrm>
+            <a:off x="7644028" y="6436231"/>
+            <a:ext cx="317500" cy="317500"/>
+          </a:xfrm>
+          <a:prstGeom prst="ellipse">
+            <a:avLst/>
+          </a:prstGeom>
+        </p:spPr>
+        <p:style>
+          <a:lnRef idx="2">
+            <a:schemeClr val="dk1"/>
+          </a:lnRef>
+          <a:fillRef idx="1">
+            <a:schemeClr val="lt1"/>
+          </a:fillRef>
+          <a:effectRef idx="0">
+            <a:schemeClr val="dk1"/>
+          </a:effectRef>
+          <a:fontRef idx="minor">
+            <a:schemeClr val="dk1"/>
+          </a:fontRef>
+        </p:style>
+        <p:txBody>
+          <a:bodyPr rtlCol="0" anchor="ctr"/>
+          <a:lstStyle/>
+          <a:p>
+            <a:pPr algn="ctr"/>
+            <a:r>
+              <a:rPr lang="en-US" sz="1801" dirty="0" smtClean="0"/>
+              <a:t>4</a:t>
+            </a:r>
+          </a:p>
+        </p:txBody>
+      </p:sp>
+      <p:sp>
+        <p:nvSpPr>
+          <p:cNvPr id="101" name="Oval 100"/>
+          <p:cNvSpPr/>
+          <p:nvPr/>
+        </p:nvSpPr>
+        <p:spPr>
+          <a:xfrm>
+            <a:off x="1631042" y="8476549"/>
+            <a:ext cx="317500" cy="317500"/>
+          </a:xfrm>
+          <a:prstGeom prst="ellipse">
+            <a:avLst/>
+          </a:prstGeom>
+        </p:spPr>
+        <p:style>
+          <a:lnRef idx="2">
+            <a:schemeClr val="dk1"/>
+          </a:lnRef>
+          <a:fillRef idx="1">
+            <a:schemeClr val="lt1"/>
+          </a:fillRef>
+          <a:effectRef idx="0">
+            <a:schemeClr val="dk1"/>
+          </a:effectRef>
+          <a:fontRef idx="minor">
+            <a:schemeClr val="dk1"/>
+          </a:fontRef>
+        </p:style>
+        <p:txBody>
+          <a:bodyPr rtlCol="0" anchor="ctr"/>
+          <a:lstStyle/>
+          <a:p>
+            <a:pPr algn="ctr"/>
+            <a:r>
+              <a:rPr lang="en-US" sz="1801" dirty="0"/>
+              <a:t>0</a:t>
+            </a:r>
+            <a:endParaRPr lang="en-US" sz="1801" dirty="0">
+              <a:solidFill>
+                <a:schemeClr val="dk1"/>
+              </a:solidFill>
+            </a:endParaRPr>
+          </a:p>
+        </p:txBody>
+      </p:sp>
+      <p:sp>
+        <p:nvSpPr>
+          <p:cNvPr id="102" name="Oval 101"/>
+          <p:cNvSpPr/>
+          <p:nvPr/>
+        </p:nvSpPr>
+        <p:spPr>
+          <a:xfrm>
+            <a:off x="3131688" y="8476549"/>
+            <a:ext cx="317500" cy="317500"/>
+          </a:xfrm>
+          <a:prstGeom prst="ellipse">
+            <a:avLst/>
+          </a:prstGeom>
+        </p:spPr>
+        <p:style>
+          <a:lnRef idx="2">
+            <a:schemeClr val="dk1"/>
+          </a:lnRef>
+          <a:fillRef idx="1">
+            <a:schemeClr val="lt1"/>
+          </a:fillRef>
+          <a:effectRef idx="0">
+            <a:schemeClr val="dk1"/>
+          </a:effectRef>
+          <a:fontRef idx="minor">
+            <a:schemeClr val="dk1"/>
+          </a:fontRef>
+        </p:style>
+        <p:txBody>
+          <a:bodyPr rtlCol="0" anchor="ctr"/>
+          <a:lstStyle/>
+          <a:p>
+            <a:pPr algn="ctr"/>
+            <a:r>
+              <a:rPr lang="en-US" sz="1801" dirty="0" smtClean="0"/>
+              <a:t>1</a:t>
+            </a:r>
+            <a:endParaRPr lang="en-US" sz="1801" dirty="0">
+              <a:solidFill>
+                <a:schemeClr val="dk1"/>
+              </a:solidFill>
+            </a:endParaRPr>
+          </a:p>
+        </p:txBody>
+      </p:sp>
+      <p:sp>
+        <p:nvSpPr>
+          <p:cNvPr id="103" name="Oval 102"/>
+          <p:cNvSpPr/>
+          <p:nvPr/>
+        </p:nvSpPr>
+        <p:spPr>
+          <a:xfrm>
+            <a:off x="1631042" y="9942594"/>
+            <a:ext cx="317500" cy="317500"/>
+          </a:xfrm>
+          <a:prstGeom prst="ellipse">
+            <a:avLst/>
+          </a:prstGeom>
+        </p:spPr>
+        <p:style>
+          <a:lnRef idx="2">
+            <a:schemeClr val="dk1"/>
+          </a:lnRef>
+          <a:fillRef idx="1">
+            <a:schemeClr val="lt1"/>
+          </a:fillRef>
+          <a:effectRef idx="0">
+            <a:schemeClr val="dk1"/>
+          </a:effectRef>
+          <a:fontRef idx="minor">
+            <a:schemeClr val="dk1"/>
+          </a:fontRef>
+        </p:style>
+        <p:txBody>
+          <a:bodyPr rtlCol="0" anchor="ctr"/>
+          <a:lstStyle/>
+          <a:p>
+            <a:pPr algn="ctr"/>
+            <a:r>
+              <a:rPr lang="en-US" sz="1801" dirty="0" smtClean="0"/>
+              <a:t>2</a:t>
+            </a:r>
+          </a:p>
+        </p:txBody>
+      </p:sp>
+      <p:cxnSp>
+        <p:nvCxnSpPr>
+          <p:cNvPr id="105" name="Straight Arrow Connector 104"/>
+          <p:cNvCxnSpPr>
+            <a:stCxn id="101" idx="6"/>
+            <a:endCxn id="102" idx="2"/>
+          </p:cNvCxnSpPr>
+          <p:nvPr/>
+        </p:nvCxnSpPr>
+        <p:spPr>
+          <a:xfrm>
+            <a:off x="1948542" y="8635299"/>
+            <a:ext cx="1183146" cy="0"/>
+          </a:xfrm>
+          <a:prstGeom prst="straightConnector1">
+            <a:avLst/>
+          </a:prstGeom>
+          <a:ln>
+            <a:tailEnd type="triangle"/>
+          </a:ln>
+        </p:spPr>
+        <p:style>
+          <a:lnRef idx="2">
+            <a:schemeClr val="dk1"/>
+          </a:lnRef>
+          <a:fillRef idx="0">
+            <a:schemeClr val="dk1"/>
+          </a:fillRef>
+          <a:effectRef idx="1">
+            <a:schemeClr val="dk1"/>
+          </a:effectRef>
+          <a:fontRef idx="minor">
+            <a:schemeClr val="tx1"/>
+          </a:fontRef>
+        </p:style>
+      </p:cxnSp>
+      <p:cxnSp>
+        <p:nvCxnSpPr>
+          <p:cNvPr id="106" name="Straight Arrow Connector 105"/>
+          <p:cNvCxnSpPr>
+            <a:stCxn id="101" idx="4"/>
+            <a:endCxn id="103" idx="0"/>
+          </p:cNvCxnSpPr>
+          <p:nvPr/>
+        </p:nvCxnSpPr>
+        <p:spPr>
+          <a:xfrm>
+            <a:off x="1789792" y="8794049"/>
+            <a:ext cx="0" cy="1148545"/>
+          </a:xfrm>
+          <a:prstGeom prst="straightConnector1">
+            <a:avLst/>
+          </a:prstGeom>
+          <a:ln>
+            <a:tailEnd type="triangle"/>
+          </a:ln>
+        </p:spPr>
+        <p:style>
+          <a:lnRef idx="2">
+            <a:schemeClr val="dk1"/>
+          </a:lnRef>
+          <a:fillRef idx="0">
+            <a:schemeClr val="dk1"/>
+          </a:fillRef>
+          <a:effectRef idx="1">
+            <a:schemeClr val="dk1"/>
+          </a:effectRef>
+          <a:fontRef idx="minor">
+            <a:schemeClr val="tx1"/>
+          </a:fontRef>
+        </p:style>
+      </p:cxnSp>
+      <p:sp>
+        <p:nvSpPr>
+          <p:cNvPr id="109" name="Oval 108"/>
+          <p:cNvSpPr/>
+          <p:nvPr/>
+        </p:nvSpPr>
+        <p:spPr>
+          <a:xfrm>
+            <a:off x="3131691" y="9940373"/>
+            <a:ext cx="317500" cy="317500"/>
+          </a:xfrm>
+          <a:prstGeom prst="ellipse">
+            <a:avLst/>
+          </a:prstGeom>
+        </p:spPr>
+        <p:style>
+          <a:lnRef idx="2">
+            <a:schemeClr val="dk1"/>
+          </a:lnRef>
+          <a:fillRef idx="1">
+            <a:schemeClr val="lt1"/>
+          </a:fillRef>
+          <a:effectRef idx="0">
+            <a:schemeClr val="dk1"/>
+          </a:effectRef>
+          <a:fontRef idx="minor">
+            <a:schemeClr val="dk1"/>
+          </a:fontRef>
+        </p:style>
+        <p:txBody>
+          <a:bodyPr rtlCol="0" anchor="ctr"/>
+          <a:lstStyle/>
+          <a:p>
+            <a:pPr algn="ctr"/>
+            <a:r>
+              <a:rPr lang="en-US" sz="1801" dirty="0" smtClean="0"/>
+              <a:t>4</a:t>
+            </a:r>
+          </a:p>
+        </p:txBody>
+      </p:sp>
+      <p:sp>
+        <p:nvSpPr>
+          <p:cNvPr id="114" name="Oval 113"/>
+          <p:cNvSpPr/>
+          <p:nvPr/>
+        </p:nvSpPr>
+        <p:spPr>
+          <a:xfrm>
+            <a:off x="5406455" y="8474328"/>
+            <a:ext cx="317500" cy="317500"/>
+          </a:xfrm>
+          <a:prstGeom prst="ellipse">
+            <a:avLst/>
+          </a:prstGeom>
+        </p:spPr>
+        <p:style>
+          <a:lnRef idx="2">
+            <a:schemeClr val="dk1"/>
+          </a:lnRef>
+          <a:fillRef idx="1">
+            <a:schemeClr val="lt1"/>
+          </a:fillRef>
+          <a:effectRef idx="0">
+            <a:schemeClr val="dk1"/>
+          </a:effectRef>
+          <a:fontRef idx="minor">
+            <a:schemeClr val="dk1"/>
+          </a:fontRef>
+        </p:style>
+        <p:txBody>
+          <a:bodyPr rtlCol="0" anchor="ctr"/>
+          <a:lstStyle/>
+          <a:p>
+            <a:pPr algn="ctr"/>
+            <a:r>
+              <a:rPr lang="en-US" sz="1801" dirty="0"/>
+              <a:t>0</a:t>
+            </a:r>
+            <a:endParaRPr lang="en-US" sz="1801" dirty="0">
+              <a:solidFill>
+                <a:schemeClr val="dk1"/>
+              </a:solidFill>
+            </a:endParaRPr>
+          </a:p>
+        </p:txBody>
+      </p:sp>
+      <p:sp>
+        <p:nvSpPr>
+          <p:cNvPr id="115" name="Oval 114"/>
+          <p:cNvSpPr/>
+          <p:nvPr/>
+        </p:nvSpPr>
+        <p:spPr>
+          <a:xfrm>
+            <a:off x="6907101" y="8474328"/>
+            <a:ext cx="317500" cy="317500"/>
+          </a:xfrm>
+          <a:prstGeom prst="ellipse">
+            <a:avLst/>
+          </a:prstGeom>
+        </p:spPr>
+        <p:style>
+          <a:lnRef idx="2">
+            <a:schemeClr val="dk1"/>
+          </a:lnRef>
+          <a:fillRef idx="1">
+            <a:schemeClr val="lt1"/>
+          </a:fillRef>
+          <a:effectRef idx="0">
+            <a:schemeClr val="dk1"/>
+          </a:effectRef>
+          <a:fontRef idx="minor">
+            <a:schemeClr val="dk1"/>
+          </a:fontRef>
+        </p:style>
+        <p:txBody>
+          <a:bodyPr rtlCol="0" anchor="ctr"/>
+          <a:lstStyle/>
+          <a:p>
+            <a:pPr algn="ctr"/>
+            <a:r>
+              <a:rPr lang="en-US" sz="1801" dirty="0" smtClean="0"/>
+              <a:t>1</a:t>
+            </a:r>
+            <a:endParaRPr lang="en-US" sz="1801" dirty="0">
+              <a:solidFill>
+                <a:schemeClr val="dk1"/>
+              </a:solidFill>
+            </a:endParaRPr>
+          </a:p>
+        </p:txBody>
+      </p:sp>
+      <p:sp>
+        <p:nvSpPr>
+          <p:cNvPr id="116" name="Oval 115"/>
+          <p:cNvSpPr/>
+          <p:nvPr/>
+        </p:nvSpPr>
+        <p:spPr>
+          <a:xfrm>
+            <a:off x="5406455" y="9940373"/>
+            <a:ext cx="317500" cy="317500"/>
+          </a:xfrm>
+          <a:prstGeom prst="ellipse">
+            <a:avLst/>
+          </a:prstGeom>
+        </p:spPr>
+        <p:style>
+          <a:lnRef idx="2">
+            <a:schemeClr val="dk1"/>
+          </a:lnRef>
+          <a:fillRef idx="1">
+            <a:schemeClr val="lt1"/>
+          </a:fillRef>
+          <a:effectRef idx="0">
+            <a:schemeClr val="dk1"/>
+          </a:effectRef>
+          <a:fontRef idx="minor">
+            <a:schemeClr val="dk1"/>
+          </a:fontRef>
+        </p:style>
+        <p:txBody>
+          <a:bodyPr rtlCol="0" anchor="ctr"/>
+          <a:lstStyle/>
+          <a:p>
+            <a:pPr algn="ctr"/>
+            <a:r>
+              <a:rPr lang="en-US" sz="1801" dirty="0" smtClean="0"/>
+              <a:t>2</a:t>
+            </a:r>
+          </a:p>
+        </p:txBody>
+      </p:sp>
+      <p:cxnSp>
+        <p:nvCxnSpPr>
+          <p:cNvPr id="117" name="Straight Arrow Connector 116"/>
+          <p:cNvCxnSpPr>
+            <a:stCxn id="114" idx="6"/>
+            <a:endCxn id="115" idx="2"/>
+          </p:cNvCxnSpPr>
+          <p:nvPr/>
+        </p:nvCxnSpPr>
+        <p:spPr>
+          <a:xfrm>
+            <a:off x="5723955" y="8633078"/>
+            <a:ext cx="1183146" cy="0"/>
+          </a:xfrm>
+          <a:prstGeom prst="straightConnector1">
+            <a:avLst/>
+          </a:prstGeom>
+          <a:ln>
+            <a:tailEnd type="triangle"/>
+          </a:ln>
+        </p:spPr>
+        <p:style>
+          <a:lnRef idx="2">
+            <a:schemeClr val="dk1"/>
+          </a:lnRef>
+          <a:fillRef idx="0">
+            <a:schemeClr val="dk1"/>
+          </a:fillRef>
+          <a:effectRef idx="1">
+            <a:schemeClr val="dk1"/>
+          </a:effectRef>
+          <a:fontRef idx="minor">
+            <a:schemeClr val="tx1"/>
+          </a:fontRef>
+        </p:style>
+      </p:cxnSp>
+      <p:cxnSp>
+        <p:nvCxnSpPr>
+          <p:cNvPr id="118" name="Straight Arrow Connector 117"/>
+          <p:cNvCxnSpPr>
+            <a:stCxn id="114" idx="4"/>
+            <a:endCxn id="116" idx="0"/>
+          </p:cNvCxnSpPr>
+          <p:nvPr/>
+        </p:nvCxnSpPr>
+        <p:spPr>
+          <a:xfrm>
+            <a:off x="5565205" y="8791828"/>
+            <a:ext cx="0" cy="1148545"/>
+          </a:xfrm>
+          <a:prstGeom prst="straightConnector1">
+            <a:avLst/>
+          </a:prstGeom>
+          <a:ln>
+            <a:tailEnd type="triangle"/>
+          </a:ln>
+        </p:spPr>
+        <p:style>
+          <a:lnRef idx="2">
+            <a:schemeClr val="dk1"/>
+          </a:lnRef>
+          <a:fillRef idx="0">
+            <a:schemeClr val="dk1"/>
+          </a:fillRef>
+          <a:effectRef idx="1">
+            <a:schemeClr val="dk1"/>
+          </a:effectRef>
+          <a:fontRef idx="minor">
+            <a:schemeClr val="tx1"/>
+          </a:fontRef>
+        </p:style>
+      </p:cxnSp>
+      <p:sp>
+        <p:nvSpPr>
+          <p:cNvPr id="119" name="Oval 118"/>
+          <p:cNvSpPr/>
+          <p:nvPr/>
+        </p:nvSpPr>
+        <p:spPr>
+          <a:xfrm>
+            <a:off x="6907101" y="9935942"/>
+            <a:ext cx="317500" cy="317500"/>
+          </a:xfrm>
+          <a:prstGeom prst="ellipse">
+            <a:avLst/>
+          </a:prstGeom>
+        </p:spPr>
+        <p:style>
+          <a:lnRef idx="2">
+            <a:schemeClr val="dk1"/>
+          </a:lnRef>
+          <a:fillRef idx="1">
+            <a:schemeClr val="lt1"/>
+          </a:fillRef>
+          <a:effectRef idx="0">
+            <a:schemeClr val="dk1"/>
+          </a:effectRef>
+          <a:fontRef idx="minor">
+            <a:schemeClr val="dk1"/>
+          </a:fontRef>
+        </p:style>
+        <p:txBody>
+          <a:bodyPr rtlCol="0" anchor="ctr"/>
+          <a:lstStyle/>
+          <a:p>
+            <a:pPr algn="ctr"/>
+            <a:r>
+              <a:rPr lang="en-US" sz="1801" dirty="0" smtClean="0"/>
+              <a:t>4</a:t>
+            </a:r>
+          </a:p>
+        </p:txBody>
+      </p:sp>
+      <p:cxnSp>
+        <p:nvCxnSpPr>
+          <p:cNvPr id="124" name="Straight Arrow Connector 123"/>
+          <p:cNvCxnSpPr>
+            <a:stCxn id="115" idx="4"/>
+            <a:endCxn id="119" idx="0"/>
+          </p:cNvCxnSpPr>
+          <p:nvPr/>
+        </p:nvCxnSpPr>
+        <p:spPr>
+          <a:xfrm>
+            <a:off x="7065851" y="8791828"/>
+            <a:ext cx="0" cy="1144114"/>
+          </a:xfrm>
+          <a:prstGeom prst="straightConnector1">
+            <a:avLst/>
+          </a:prstGeom>
+          <a:ln>
+            <a:tailEnd type="triangle"/>
+          </a:ln>
+        </p:spPr>
+        <p:style>
+          <a:lnRef idx="2">
+            <a:schemeClr val="dk1"/>
+          </a:lnRef>
+          <a:fillRef idx="0">
+            <a:schemeClr val="dk1"/>
+          </a:fillRef>
+          <a:effectRef idx="1">
+            <a:schemeClr val="dk1"/>
+          </a:effectRef>
+          <a:fontRef idx="minor">
+            <a:schemeClr val="tx1"/>
+          </a:fontRef>
+        </p:style>
+      </p:cxnSp>
+      <p:sp>
+        <p:nvSpPr>
+          <p:cNvPr id="127" name="Oval 126"/>
+          <p:cNvSpPr/>
+          <p:nvPr/>
+        </p:nvSpPr>
+        <p:spPr>
+          <a:xfrm>
+            <a:off x="8720864" y="8474328"/>
+            <a:ext cx="317500" cy="317500"/>
+          </a:xfrm>
+          <a:prstGeom prst="ellipse">
+            <a:avLst/>
+          </a:prstGeom>
+        </p:spPr>
+        <p:style>
+          <a:lnRef idx="2">
+            <a:schemeClr val="dk1"/>
+          </a:lnRef>
+          <a:fillRef idx="1">
+            <a:schemeClr val="lt1"/>
+          </a:fillRef>
+          <a:effectRef idx="0">
+            <a:schemeClr val="dk1"/>
+          </a:effectRef>
+          <a:fontRef idx="minor">
+            <a:schemeClr val="dk1"/>
+          </a:fontRef>
+        </p:style>
+        <p:txBody>
+          <a:bodyPr rtlCol="0" anchor="ctr"/>
+          <a:lstStyle/>
+          <a:p>
+            <a:pPr algn="ctr"/>
+            <a:r>
+              <a:rPr lang="en-US" sz="1801" dirty="0"/>
+              <a:t>0</a:t>
+            </a:r>
+            <a:endParaRPr lang="en-US" sz="1801" dirty="0">
+              <a:solidFill>
+                <a:schemeClr val="dk1"/>
+              </a:solidFill>
+            </a:endParaRPr>
+          </a:p>
+        </p:txBody>
+      </p:sp>
+      <p:sp>
+        <p:nvSpPr>
+          <p:cNvPr id="128" name="Oval 127"/>
+          <p:cNvSpPr/>
+          <p:nvPr/>
+        </p:nvSpPr>
+        <p:spPr>
+          <a:xfrm>
+            <a:off x="10221510" y="8474328"/>
+            <a:ext cx="317500" cy="317500"/>
+          </a:xfrm>
+          <a:prstGeom prst="ellipse">
+            <a:avLst/>
+          </a:prstGeom>
+        </p:spPr>
+        <p:style>
+          <a:lnRef idx="2">
+            <a:schemeClr val="dk1"/>
+          </a:lnRef>
+          <a:fillRef idx="1">
+            <a:schemeClr val="lt1"/>
+          </a:fillRef>
+          <a:effectRef idx="0">
+            <a:schemeClr val="dk1"/>
+          </a:effectRef>
+          <a:fontRef idx="minor">
+            <a:schemeClr val="dk1"/>
+          </a:fontRef>
+        </p:style>
+        <p:txBody>
+          <a:bodyPr rtlCol="0" anchor="ctr"/>
+          <a:lstStyle/>
+          <a:p>
+            <a:pPr algn="ctr"/>
+            <a:r>
+              <a:rPr lang="en-US" sz="1801" dirty="0" smtClean="0"/>
+              <a:t>1</a:t>
+            </a:r>
+            <a:endParaRPr lang="en-US" sz="1801" dirty="0">
+              <a:solidFill>
+                <a:schemeClr val="dk1"/>
+              </a:solidFill>
+            </a:endParaRPr>
+          </a:p>
+        </p:txBody>
+      </p:sp>
+      <p:sp>
+        <p:nvSpPr>
+          <p:cNvPr id="129" name="Oval 128"/>
+          <p:cNvSpPr/>
+          <p:nvPr/>
+        </p:nvSpPr>
+        <p:spPr>
+          <a:xfrm>
+            <a:off x="10221510" y="9935942"/>
+            <a:ext cx="317500" cy="317500"/>
+          </a:xfrm>
+          <a:prstGeom prst="ellipse">
+            <a:avLst/>
+          </a:prstGeom>
+        </p:spPr>
+        <p:style>
+          <a:lnRef idx="2">
+            <a:schemeClr val="dk1"/>
+          </a:lnRef>
+          <a:fillRef idx="1">
+            <a:schemeClr val="lt1"/>
+          </a:fillRef>
+          <a:effectRef idx="0">
+            <a:schemeClr val="dk1"/>
+          </a:effectRef>
+          <a:fontRef idx="minor">
+            <a:schemeClr val="dk1"/>
+          </a:fontRef>
+        </p:style>
+        <p:txBody>
+          <a:bodyPr rtlCol="0" anchor="ctr"/>
+          <a:lstStyle/>
+          <a:p>
+            <a:pPr algn="ctr"/>
+            <a:r>
+              <a:rPr lang="en-US" sz="1801" dirty="0" smtClean="0"/>
+              <a:t>2</a:t>
+            </a:r>
+          </a:p>
+        </p:txBody>
+      </p:sp>
+      <p:cxnSp>
+        <p:nvCxnSpPr>
+          <p:cNvPr id="130" name="Straight Arrow Connector 129"/>
+          <p:cNvCxnSpPr>
+            <a:stCxn id="127" idx="6"/>
+            <a:endCxn id="128" idx="2"/>
+          </p:cNvCxnSpPr>
+          <p:nvPr/>
+        </p:nvCxnSpPr>
+        <p:spPr>
+          <a:xfrm>
+            <a:off x="9038364" y="8633078"/>
+            <a:ext cx="1183146" cy="0"/>
+          </a:xfrm>
+          <a:prstGeom prst="straightConnector1">
+            <a:avLst/>
+          </a:prstGeom>
+          <a:ln>
+            <a:tailEnd type="triangle"/>
+          </a:ln>
+        </p:spPr>
+        <p:style>
+          <a:lnRef idx="2">
+            <a:schemeClr val="dk1"/>
+          </a:lnRef>
+          <a:fillRef idx="0">
+            <a:schemeClr val="dk1"/>
+          </a:fillRef>
+          <a:effectRef idx="1">
+            <a:schemeClr val="dk1"/>
+          </a:effectRef>
+          <a:fontRef idx="minor">
+            <a:schemeClr val="tx1"/>
+          </a:fontRef>
+        </p:style>
+      </p:cxnSp>
+      <p:cxnSp>
+        <p:nvCxnSpPr>
+          <p:cNvPr id="131" name="Straight Arrow Connector 130"/>
+          <p:cNvCxnSpPr>
+            <a:stCxn id="127" idx="5"/>
+            <a:endCxn id="129" idx="1"/>
+          </p:cNvCxnSpPr>
+          <p:nvPr/>
+        </p:nvCxnSpPr>
+        <p:spPr>
+          <a:xfrm>
+            <a:off x="8991867" y="8745331"/>
+            <a:ext cx="1276140" cy="1237108"/>
+          </a:xfrm>
+          <a:prstGeom prst="straightConnector1">
+            <a:avLst/>
+          </a:prstGeom>
+          <a:ln>
+            <a:tailEnd type="triangle"/>
+          </a:ln>
+        </p:spPr>
+        <p:style>
+          <a:lnRef idx="2">
+            <a:schemeClr val="dk1"/>
+          </a:lnRef>
+          <a:fillRef idx="0">
+            <a:schemeClr val="dk1"/>
+          </a:fillRef>
+          <a:effectRef idx="1">
+            <a:schemeClr val="dk1"/>
+          </a:effectRef>
+          <a:fontRef idx="minor">
+            <a:schemeClr val="tx1"/>
+          </a:fontRef>
+        </p:style>
+      </p:cxnSp>
+      <p:sp>
+        <p:nvSpPr>
+          <p:cNvPr id="132" name="Oval 131"/>
+          <p:cNvSpPr/>
+          <p:nvPr/>
+        </p:nvSpPr>
+        <p:spPr>
+          <a:xfrm>
+            <a:off x="8720864" y="9942594"/>
+            <a:ext cx="317500" cy="317500"/>
+          </a:xfrm>
+          <a:prstGeom prst="ellipse">
+            <a:avLst/>
+          </a:prstGeom>
+        </p:spPr>
+        <p:style>
+          <a:lnRef idx="2">
+            <a:schemeClr val="dk1"/>
+          </a:lnRef>
+          <a:fillRef idx="1">
+            <a:schemeClr val="lt1"/>
+          </a:fillRef>
+          <a:effectRef idx="0">
+            <a:schemeClr val="dk1"/>
+          </a:effectRef>
+          <a:fontRef idx="minor">
+            <a:schemeClr val="dk1"/>
+          </a:fontRef>
+        </p:style>
+        <p:txBody>
+          <a:bodyPr rtlCol="0" anchor="ctr"/>
+          <a:lstStyle/>
+          <a:p>
+            <a:pPr algn="ctr"/>
+            <a:r>
+              <a:rPr lang="en-US" sz="1801" dirty="0" smtClean="0"/>
+              <a:t>4</a:t>
+            </a:r>
+          </a:p>
+        </p:txBody>
+      </p:sp>
+      <p:cxnSp>
+        <p:nvCxnSpPr>
+          <p:cNvPr id="133" name="Straight Arrow Connector 132"/>
+          <p:cNvCxnSpPr>
+            <a:stCxn id="128" idx="3"/>
+            <a:endCxn id="132" idx="7"/>
+          </p:cNvCxnSpPr>
+          <p:nvPr/>
+        </p:nvCxnSpPr>
+        <p:spPr>
+          <a:xfrm flipH="1">
+            <a:off x="8991867" y="8745331"/>
+            <a:ext cx="1276140" cy="1243760"/>
+          </a:xfrm>
+          <a:prstGeom prst="straightConnector1">
+            <a:avLst/>
+          </a:prstGeom>
+          <a:ln>
+            <a:tailEnd type="triangle"/>
+          </a:ln>
+        </p:spPr>
+        <p:style>
+          <a:lnRef idx="2">
+            <a:schemeClr val="dk1"/>
+          </a:lnRef>
+          <a:fillRef idx="0">
+            <a:schemeClr val="dk1"/>
+          </a:fillRef>
+          <a:effectRef idx="1">
+            <a:schemeClr val="dk1"/>
+          </a:effectRef>
+          <a:fontRef idx="minor">
+            <a:schemeClr val="tx1"/>
+          </a:fontRef>
+        </p:style>
+      </p:cxnSp>
+      <p:cxnSp>
+        <p:nvCxnSpPr>
+          <p:cNvPr id="140" name="Straight Arrow Connector 139"/>
+          <p:cNvCxnSpPr>
+            <a:stCxn id="127" idx="4"/>
+            <a:endCxn id="132" idx="0"/>
+          </p:cNvCxnSpPr>
+          <p:nvPr/>
+        </p:nvCxnSpPr>
+        <p:spPr>
+          <a:xfrm>
+            <a:off x="8879614" y="8791828"/>
+            <a:ext cx="0" cy="1150766"/>
+          </a:xfrm>
+          <a:prstGeom prst="straightConnector1">
+            <a:avLst/>
+          </a:prstGeom>
+          <a:ln>
+            <a:tailEnd type="triangle"/>
+          </a:ln>
+        </p:spPr>
+        <p:style>
+          <a:lnRef idx="2">
+            <a:schemeClr val="dk1"/>
+          </a:lnRef>
+          <a:fillRef idx="0">
+            <a:schemeClr val="dk1"/>
+          </a:fillRef>
+          <a:effectRef idx="1">
+            <a:schemeClr val="dk1"/>
+          </a:effectRef>
+          <a:fontRef idx="minor">
+            <a:schemeClr val="tx1"/>
+          </a:fontRef>
+        </p:style>
+      </p:cxnSp>
+      <p:sp>
+        <p:nvSpPr>
+          <p:cNvPr id="153" name="Oval 152"/>
+          <p:cNvSpPr/>
+          <p:nvPr/>
+        </p:nvSpPr>
+        <p:spPr>
+          <a:xfrm>
+            <a:off x="11717773" y="8474328"/>
+            <a:ext cx="317500" cy="317500"/>
+          </a:xfrm>
+          <a:prstGeom prst="ellipse">
+            <a:avLst/>
+          </a:prstGeom>
+        </p:spPr>
+        <p:style>
+          <a:lnRef idx="2">
+            <a:schemeClr val="dk1"/>
+          </a:lnRef>
+          <a:fillRef idx="1">
+            <a:schemeClr val="lt1"/>
+          </a:fillRef>
+          <a:effectRef idx="0">
+            <a:schemeClr val="dk1"/>
+          </a:effectRef>
+          <a:fontRef idx="minor">
+            <a:schemeClr val="dk1"/>
+          </a:fontRef>
+        </p:style>
+        <p:txBody>
+          <a:bodyPr rtlCol="0" anchor="ctr"/>
+          <a:lstStyle/>
+          <a:p>
+            <a:pPr algn="ctr"/>
+            <a:r>
+              <a:rPr lang="en-US" sz="1801" dirty="0"/>
+              <a:t>0</a:t>
+            </a:r>
+            <a:endParaRPr lang="en-US" sz="1801" dirty="0">
+              <a:solidFill>
+                <a:schemeClr val="dk1"/>
+              </a:solidFill>
+            </a:endParaRPr>
+          </a:p>
+        </p:txBody>
+      </p:sp>
+      <p:sp>
+        <p:nvSpPr>
+          <p:cNvPr id="154" name="Oval 153"/>
+          <p:cNvSpPr/>
+          <p:nvPr/>
+        </p:nvSpPr>
+        <p:spPr>
+          <a:xfrm>
+            <a:off x="13218419" y="8474328"/>
+            <a:ext cx="317500" cy="317500"/>
+          </a:xfrm>
+          <a:prstGeom prst="ellipse">
+            <a:avLst/>
+          </a:prstGeom>
+        </p:spPr>
+        <p:style>
+          <a:lnRef idx="2">
+            <a:schemeClr val="dk1"/>
+          </a:lnRef>
+          <a:fillRef idx="1">
+            <a:schemeClr val="lt1"/>
+          </a:fillRef>
+          <a:effectRef idx="0">
+            <a:schemeClr val="dk1"/>
+          </a:effectRef>
+          <a:fontRef idx="minor">
+            <a:schemeClr val="dk1"/>
+          </a:fontRef>
+        </p:style>
+        <p:txBody>
+          <a:bodyPr rtlCol="0" anchor="ctr"/>
+          <a:lstStyle/>
+          <a:p>
+            <a:pPr algn="ctr"/>
+            <a:r>
+              <a:rPr lang="en-US" sz="1801" dirty="0" smtClean="0"/>
+              <a:t>1</a:t>
+            </a:r>
+            <a:endParaRPr lang="en-US" sz="1801" dirty="0">
+              <a:solidFill>
+                <a:schemeClr val="dk1"/>
+              </a:solidFill>
+            </a:endParaRPr>
+          </a:p>
+        </p:txBody>
+      </p:sp>
+      <p:sp>
+        <p:nvSpPr>
+          <p:cNvPr id="155" name="Oval 154"/>
+          <p:cNvSpPr/>
+          <p:nvPr/>
+        </p:nvSpPr>
+        <p:spPr>
+          <a:xfrm>
+            <a:off x="13218419" y="9935942"/>
+            <a:ext cx="317500" cy="317500"/>
+          </a:xfrm>
+          <a:prstGeom prst="ellipse">
+            <a:avLst/>
+          </a:prstGeom>
+        </p:spPr>
+        <p:style>
+          <a:lnRef idx="2">
+            <a:schemeClr val="dk1"/>
+          </a:lnRef>
+          <a:fillRef idx="1">
+            <a:schemeClr val="lt1"/>
+          </a:fillRef>
+          <a:effectRef idx="0">
+            <a:schemeClr val="dk1"/>
+          </a:effectRef>
+          <a:fontRef idx="minor">
+            <a:schemeClr val="dk1"/>
+          </a:fontRef>
+        </p:style>
+        <p:txBody>
+          <a:bodyPr rtlCol="0" anchor="ctr"/>
+          <a:lstStyle/>
+          <a:p>
+            <a:pPr algn="ctr"/>
+            <a:r>
+              <a:rPr lang="en-US" sz="1801" dirty="0" smtClean="0"/>
+              <a:t>2</a:t>
+            </a:r>
+          </a:p>
+        </p:txBody>
+      </p:sp>
+      <p:cxnSp>
+        <p:nvCxnSpPr>
+          <p:cNvPr id="156" name="Straight Arrow Connector 155"/>
+          <p:cNvCxnSpPr>
+            <a:stCxn id="153" idx="6"/>
+            <a:endCxn id="154" idx="2"/>
+          </p:cNvCxnSpPr>
+          <p:nvPr/>
+        </p:nvCxnSpPr>
+        <p:spPr>
+          <a:xfrm>
+            <a:off x="12035273" y="8633078"/>
+            <a:ext cx="1183146" cy="0"/>
+          </a:xfrm>
+          <a:prstGeom prst="straightConnector1">
+            <a:avLst/>
+          </a:prstGeom>
+          <a:ln>
+            <a:tailEnd type="triangle"/>
+          </a:ln>
+        </p:spPr>
+        <p:style>
+          <a:lnRef idx="2">
+            <a:schemeClr val="dk1"/>
+          </a:lnRef>
+          <a:fillRef idx="0">
+            <a:schemeClr val="dk1"/>
+          </a:fillRef>
+          <a:effectRef idx="1">
+            <a:schemeClr val="dk1"/>
+          </a:effectRef>
+          <a:fontRef idx="minor">
+            <a:schemeClr val="tx1"/>
+          </a:fontRef>
+        </p:style>
+      </p:cxnSp>
+      <p:sp>
+        <p:nvSpPr>
+          <p:cNvPr id="158" name="Oval 157"/>
+          <p:cNvSpPr/>
+          <p:nvPr/>
+        </p:nvSpPr>
+        <p:spPr>
+          <a:xfrm>
+            <a:off x="11717773" y="9942594"/>
+            <a:ext cx="317500" cy="317500"/>
+          </a:xfrm>
+          <a:prstGeom prst="ellipse">
+            <a:avLst/>
+          </a:prstGeom>
+        </p:spPr>
+        <p:style>
+          <a:lnRef idx="2">
+            <a:schemeClr val="dk1"/>
+          </a:lnRef>
+          <a:fillRef idx="1">
+            <a:schemeClr val="lt1"/>
+          </a:fillRef>
+          <a:effectRef idx="0">
+            <a:schemeClr val="dk1"/>
+          </a:effectRef>
+          <a:fontRef idx="minor">
+            <a:schemeClr val="dk1"/>
+          </a:fontRef>
+        </p:style>
+        <p:txBody>
+          <a:bodyPr rtlCol="0" anchor="ctr"/>
+          <a:lstStyle/>
+          <a:p>
+            <a:pPr algn="ctr"/>
+            <a:r>
+              <a:rPr lang="en-US" sz="1801" dirty="0" smtClean="0"/>
+              <a:t>4</a:t>
+            </a:r>
+          </a:p>
+        </p:txBody>
+      </p:sp>
+      <p:cxnSp>
+        <p:nvCxnSpPr>
+          <p:cNvPr id="159" name="Straight Arrow Connector 158"/>
+          <p:cNvCxnSpPr>
+            <a:stCxn id="154" idx="3"/>
+            <a:endCxn id="158" idx="7"/>
+          </p:cNvCxnSpPr>
+          <p:nvPr/>
+        </p:nvCxnSpPr>
+        <p:spPr>
+          <a:xfrm flipH="1">
+            <a:off x="11988776" y="8745331"/>
+            <a:ext cx="1276140" cy="1243760"/>
+          </a:xfrm>
+          <a:prstGeom prst="straightConnector1">
+            <a:avLst/>
+          </a:prstGeom>
+          <a:ln>
+            <a:tailEnd type="triangle"/>
+          </a:ln>
+        </p:spPr>
+        <p:style>
+          <a:lnRef idx="2">
+            <a:schemeClr val="dk1"/>
+          </a:lnRef>
+          <a:fillRef idx="0">
+            <a:schemeClr val="dk1"/>
+          </a:fillRef>
+          <a:effectRef idx="1">
+            <a:schemeClr val="dk1"/>
+          </a:effectRef>
+          <a:fontRef idx="minor">
+            <a:schemeClr val="tx1"/>
+          </a:fontRef>
+        </p:style>
+      </p:cxnSp>
+      <p:cxnSp>
+        <p:nvCxnSpPr>
+          <p:cNvPr id="160" name="Straight Arrow Connector 159"/>
+          <p:cNvCxnSpPr>
+            <a:stCxn id="153" idx="4"/>
+            <a:endCxn id="158" idx="0"/>
+          </p:cNvCxnSpPr>
+          <p:nvPr/>
+        </p:nvCxnSpPr>
+        <p:spPr>
+          <a:xfrm>
+            <a:off x="11876523" y="8791828"/>
+            <a:ext cx="0" cy="1150766"/>
+          </a:xfrm>
+          <a:prstGeom prst="straightConnector1">
+            <a:avLst/>
+          </a:prstGeom>
+          <a:ln>
+            <a:tailEnd type="triangle"/>
+          </a:ln>
+        </p:spPr>
+        <p:style>
+          <a:lnRef idx="2">
+            <a:schemeClr val="dk1"/>
+          </a:lnRef>
+          <a:fillRef idx="0">
+            <a:schemeClr val="dk1"/>
+          </a:fillRef>
+          <a:effectRef idx="1">
+            <a:schemeClr val="dk1"/>
+          </a:effectRef>
+          <a:fontRef idx="minor">
+            <a:schemeClr val="tx1"/>
+          </a:fontRef>
+        </p:style>
+      </p:cxnSp>
+      <p:sp>
+        <p:nvSpPr>
+          <p:cNvPr id="167" name="Oval 166"/>
+          <p:cNvSpPr/>
+          <p:nvPr/>
+        </p:nvSpPr>
+        <p:spPr>
+          <a:xfrm>
+            <a:off x="14448062" y="8474328"/>
+            <a:ext cx="317500" cy="317500"/>
+          </a:xfrm>
+          <a:prstGeom prst="ellipse">
+            <a:avLst/>
+          </a:prstGeom>
+        </p:spPr>
+        <p:style>
+          <a:lnRef idx="2">
+            <a:schemeClr val="dk1"/>
+          </a:lnRef>
+          <a:fillRef idx="1">
+            <a:schemeClr val="lt1"/>
+          </a:fillRef>
+          <a:effectRef idx="0">
+            <a:schemeClr val="dk1"/>
+          </a:effectRef>
+          <a:fontRef idx="minor">
+            <a:schemeClr val="dk1"/>
+          </a:fontRef>
+        </p:style>
+        <p:txBody>
+          <a:bodyPr rtlCol="0" anchor="ctr"/>
+          <a:lstStyle/>
+          <a:p>
+            <a:pPr algn="ctr"/>
+            <a:r>
+              <a:rPr lang="en-US" sz="1801" dirty="0"/>
+              <a:t>0</a:t>
+            </a:r>
+            <a:endParaRPr lang="en-US" sz="1801" dirty="0">
+              <a:solidFill>
+                <a:schemeClr val="dk1"/>
+              </a:solidFill>
+            </a:endParaRPr>
+          </a:p>
+        </p:txBody>
+      </p:sp>
+      <p:sp>
+        <p:nvSpPr>
+          <p:cNvPr id="168" name="Oval 167"/>
+          <p:cNvSpPr/>
+          <p:nvPr/>
+        </p:nvSpPr>
+        <p:spPr>
+          <a:xfrm>
+            <a:off x="14448062" y="9937254"/>
+            <a:ext cx="317500" cy="317500"/>
+          </a:xfrm>
+          <a:prstGeom prst="ellipse">
+            <a:avLst/>
+          </a:prstGeom>
+        </p:spPr>
+        <p:style>
+          <a:lnRef idx="2">
+            <a:schemeClr val="dk1"/>
+          </a:lnRef>
+          <a:fillRef idx="1">
+            <a:schemeClr val="lt1"/>
+          </a:fillRef>
+          <a:effectRef idx="0">
+            <a:schemeClr val="dk1"/>
+          </a:effectRef>
+          <a:fontRef idx="minor">
+            <a:schemeClr val="dk1"/>
+          </a:fontRef>
+        </p:style>
+        <p:txBody>
+          <a:bodyPr rtlCol="0" anchor="ctr"/>
+          <a:lstStyle/>
+          <a:p>
+            <a:pPr algn="ctr"/>
+            <a:r>
+              <a:rPr lang="en-US" sz="1801" dirty="0" smtClean="0"/>
+              <a:t>1</a:t>
+            </a:r>
+            <a:endParaRPr lang="en-US" sz="1801" dirty="0">
+              <a:solidFill>
+                <a:schemeClr val="dk1"/>
+              </a:solidFill>
+            </a:endParaRPr>
+          </a:p>
+        </p:txBody>
+      </p:sp>
+      <p:sp>
+        <p:nvSpPr>
+          <p:cNvPr id="169" name="Oval 168"/>
+          <p:cNvSpPr/>
+          <p:nvPr/>
+        </p:nvSpPr>
+        <p:spPr>
+          <a:xfrm>
+            <a:off x="15948708" y="9935942"/>
+            <a:ext cx="317500" cy="317500"/>
+          </a:xfrm>
+          <a:prstGeom prst="ellipse">
+            <a:avLst/>
+          </a:prstGeom>
+        </p:spPr>
+        <p:style>
+          <a:lnRef idx="2">
+            <a:schemeClr val="dk1"/>
+          </a:lnRef>
+          <a:fillRef idx="1">
+            <a:schemeClr val="lt1"/>
+          </a:fillRef>
+          <a:effectRef idx="0">
+            <a:schemeClr val="dk1"/>
+          </a:effectRef>
+          <a:fontRef idx="minor">
+            <a:schemeClr val="dk1"/>
+          </a:fontRef>
+        </p:style>
+        <p:txBody>
+          <a:bodyPr rtlCol="0" anchor="ctr"/>
+          <a:lstStyle/>
+          <a:p>
+            <a:pPr algn="ctr"/>
+            <a:r>
+              <a:rPr lang="en-US" sz="1801" dirty="0" smtClean="0"/>
+              <a:t>2</a:t>
+            </a:r>
+          </a:p>
+        </p:txBody>
+      </p:sp>
+      <p:cxnSp>
+        <p:nvCxnSpPr>
+          <p:cNvPr id="170" name="Straight Arrow Connector 169"/>
+          <p:cNvCxnSpPr>
+            <a:stCxn id="167" idx="4"/>
+            <a:endCxn id="168" idx="0"/>
+          </p:cNvCxnSpPr>
+          <p:nvPr/>
+        </p:nvCxnSpPr>
+        <p:spPr>
+          <a:xfrm>
+            <a:off x="14606812" y="8791828"/>
+            <a:ext cx="0" cy="1145426"/>
+          </a:xfrm>
+          <a:prstGeom prst="straightConnector1">
+            <a:avLst/>
+          </a:prstGeom>
+          <a:ln>
+            <a:tailEnd type="triangle"/>
+          </a:ln>
+        </p:spPr>
+        <p:style>
+          <a:lnRef idx="2">
+            <a:schemeClr val="dk1"/>
+          </a:lnRef>
+          <a:fillRef idx="0">
+            <a:schemeClr val="dk1"/>
+          </a:fillRef>
+          <a:effectRef idx="1">
+            <a:schemeClr val="dk1"/>
+          </a:effectRef>
+          <a:fontRef idx="minor">
+            <a:schemeClr val="tx1"/>
+          </a:fontRef>
+        </p:style>
+      </p:cxnSp>
+      <p:sp>
+        <p:nvSpPr>
+          <p:cNvPr id="171" name="Oval 170"/>
+          <p:cNvSpPr/>
+          <p:nvPr/>
+        </p:nvSpPr>
+        <p:spPr>
+          <a:xfrm>
+            <a:off x="15948708" y="8474328"/>
+            <a:ext cx="317500" cy="317500"/>
+          </a:xfrm>
+          <a:prstGeom prst="ellipse">
+            <a:avLst/>
+          </a:prstGeom>
+        </p:spPr>
+        <p:style>
+          <a:lnRef idx="2">
+            <a:schemeClr val="dk1"/>
+          </a:lnRef>
+          <a:fillRef idx="1">
+            <a:schemeClr val="lt1"/>
+          </a:fillRef>
+          <a:effectRef idx="0">
+            <a:schemeClr val="dk1"/>
+          </a:effectRef>
+          <a:fontRef idx="minor">
+            <a:schemeClr val="dk1"/>
+          </a:fontRef>
+        </p:style>
+        <p:txBody>
+          <a:bodyPr rtlCol="0" anchor="ctr"/>
+          <a:lstStyle/>
+          <a:p>
+            <a:pPr algn="ctr"/>
+            <a:r>
+              <a:rPr lang="en-US" sz="1801" dirty="0" smtClean="0"/>
+              <a:t>4</a:t>
+            </a:r>
+          </a:p>
+        </p:txBody>
+      </p:sp>
+      <p:cxnSp>
+        <p:nvCxnSpPr>
+          <p:cNvPr id="172" name="Straight Arrow Connector 171"/>
+          <p:cNvCxnSpPr>
+            <a:stCxn id="168" idx="7"/>
+            <a:endCxn id="171" idx="3"/>
+          </p:cNvCxnSpPr>
+          <p:nvPr/>
+        </p:nvCxnSpPr>
+        <p:spPr>
+          <a:xfrm flipV="1">
+            <a:off x="14719065" y="8745331"/>
+            <a:ext cx="1276140" cy="1238420"/>
+          </a:xfrm>
+          <a:prstGeom prst="straightConnector1">
+            <a:avLst/>
+          </a:prstGeom>
+          <a:ln>
+            <a:tailEnd type="triangle"/>
+          </a:ln>
+        </p:spPr>
+        <p:style>
+          <a:lnRef idx="2">
+            <a:schemeClr val="dk1"/>
+          </a:lnRef>
+          <a:fillRef idx="0">
+            <a:schemeClr val="dk1"/>
+          </a:fillRef>
+          <a:effectRef idx="1">
+            <a:schemeClr val="dk1"/>
+          </a:effectRef>
+          <a:fontRef idx="minor">
+            <a:schemeClr val="tx1"/>
+          </a:fontRef>
+        </p:style>
+      </p:cxnSp>
+      <p:cxnSp>
+        <p:nvCxnSpPr>
+          <p:cNvPr id="173" name="Straight Arrow Connector 172"/>
+          <p:cNvCxnSpPr>
+            <a:stCxn id="167" idx="6"/>
+            <a:endCxn id="171" idx="2"/>
+          </p:cNvCxnSpPr>
+          <p:nvPr/>
+        </p:nvCxnSpPr>
+        <p:spPr>
+          <a:xfrm>
+            <a:off x="14765562" y="8633078"/>
+            <a:ext cx="1183146" cy="0"/>
+          </a:xfrm>
+          <a:prstGeom prst="straightConnector1">
+            <a:avLst/>
+          </a:prstGeom>
+          <a:ln>
+            <a:tailEnd type="triangle"/>
+          </a:ln>
+        </p:spPr>
+        <p:style>
+          <a:lnRef idx="2">
+            <a:schemeClr val="dk1"/>
+          </a:lnRef>
+          <a:fillRef idx="0">
+            <a:schemeClr val="dk1"/>
+          </a:fillRef>
+          <a:effectRef idx="1">
+            <a:schemeClr val="dk1"/>
+          </a:effectRef>
+          <a:fontRef idx="minor">
+            <a:schemeClr val="tx1"/>
+          </a:fontRef>
+        </p:style>
+      </p:cxnSp>
+    </p:spTree>
+    <p:extLst>
+      <p:ext uri="{BB962C8B-B14F-4D97-AF65-F5344CB8AC3E}">
+        <p14:creationId xmlns:p14="http://schemas.microsoft.com/office/powerpoint/2010/main" val="742933048"/>
+      </p:ext>
+    </p:extLst>
+  </p:cSld>
+  <p:clrMapOvr>
+    <a:masterClrMapping/>
+  </p:clrMapOvr>
+</p:sld>
+</file>
+
 <file path=ppt/slides/slide3.xml><?xml version="1.0" encoding="utf-8"?>
 <p:sld xmlns:a="http://schemas.openxmlformats.org/drawingml/2006/main" xmlns:r="http://schemas.openxmlformats.org/officeDocument/2006/relationships" xmlns:p="http://schemas.openxmlformats.org/presentationml/2006/main">
   <p:cSld>
@@ -43398,11 +46282,7 @@
             </a:r>
             <a:r>
               <a:rPr lang="zh-CN" altLang="en-US" sz="1801" dirty="0" smtClean="0"/>
-              <a:t> </a:t>
-            </a:r>
-            <a:r>
-              <a:rPr lang="zh-CN" altLang="en-US" sz="1801" dirty="0" smtClean="0"/>
-              <a:t>切换工作图</a:t>
+              <a:t> 切换工作图</a:t>
             </a:r>
             <a:endParaRPr lang="en-US" sz="1801" dirty="0"/>
           </a:p>

</xml_diff>